<commit_message>
Update NBA Statistics Presenter.pptx
</commit_message>
<xml_diff>
--- a/NBA Statistics Presenter.pptx
+++ b/NBA Statistics Presenter.pptx
@@ -3445,8 +3445,8 @@
         </p:nvSpPr>
         <p:spPr>
           <a:xfrm>
-            <a:off x="-71847" y="1936334"/>
-            <a:ext cx="4811433" cy="3754874"/>
+            <a:off x="-71846" y="1936334"/>
+            <a:ext cx="4680288" cy="3754874"/>
           </a:xfrm>
           <a:prstGeom prst="rect">
             <a:avLst/>
@@ -3487,7 +3487,15 @@
             <a:pPr algn="ctr"/>
             <a:r>
               <a:rPr lang="en-US" sz="1700" b="1" dirty="0"/>
-              <a:t>This program uses an API to display the statistics of a player based on user input. When the user enters a player’s name, the program locates that player within the associated endpoints and returns that statistics for each season the player has played. </a:t>
+              <a:t>This program uses an API to display the statistics of a player based on user input. When the user enters a player’s name, the program locates that player within the </a:t>
+            </a:r>
+            <a:r>
+              <a:rPr lang="en-US" sz="1700" b="1"/>
+              <a:t>associated endpoint </a:t>
+            </a:r>
+            <a:r>
+              <a:rPr lang="en-US" sz="1700" b="1" dirty="0"/>
+              <a:t>and returns the statistics for each season the player has played. </a:t>
             </a:r>
           </a:p>
         </p:txBody>
@@ -3571,24 +3579,24 @@
             <a:custGeom>
               <a:avLst/>
               <a:gdLst>
-                <a:gd name="connsiteX0" fmla="*/ 699559 w 699558"/>
-                <a:gd name="connsiteY0" fmla="*/ 353712 h 353711"/>
-                <a:gd name="connsiteX1" fmla="*/ 699559 w 699558"/>
-                <a:gd name="connsiteY1" fmla="*/ 0 h 353711"/>
-                <a:gd name="connsiteX2" fmla="*/ 0 w 699558"/>
-                <a:gd name="connsiteY2" fmla="*/ 0 h 353711"/>
-                <a:gd name="connsiteX3" fmla="*/ 0 w 699558"/>
-                <a:gd name="connsiteY3" fmla="*/ 353712 h 353711"/>
-                <a:gd name="connsiteX4" fmla="*/ 38864 w 699558"/>
-                <a:gd name="connsiteY4" fmla="*/ 353712 h 353711"/>
-                <a:gd name="connsiteX5" fmla="*/ 38864 w 699558"/>
-                <a:gd name="connsiteY5" fmla="*/ 41613 h 353711"/>
-                <a:gd name="connsiteX6" fmla="*/ 660694 w 699558"/>
-                <a:gd name="connsiteY6" fmla="*/ 41613 h 353711"/>
-                <a:gd name="connsiteX7" fmla="*/ 660694 w 699558"/>
-                <a:gd name="connsiteY7" fmla="*/ 353712 h 353711"/>
-                <a:gd name="connsiteX8" fmla="*/ 699559 w 699558"/>
-                <a:gd name="connsiteY8" fmla="*/ 353712 h 353711"/>
+                <a:gd name="connsiteX0" fmla="*/ 458078 w 458077"/>
+                <a:gd name="connsiteY0" fmla="*/ 216315 h 216314"/>
+                <a:gd name="connsiteX1" fmla="*/ 458078 w 458077"/>
+                <a:gd name="connsiteY1" fmla="*/ 0 h 216314"/>
+                <a:gd name="connsiteX2" fmla="*/ 0 w 458077"/>
+                <a:gd name="connsiteY2" fmla="*/ 0 h 216314"/>
+                <a:gd name="connsiteX3" fmla="*/ 0 w 458077"/>
+                <a:gd name="connsiteY3" fmla="*/ 216315 h 216314"/>
+                <a:gd name="connsiteX4" fmla="*/ 25449 w 458077"/>
+                <a:gd name="connsiteY4" fmla="*/ 216315 h 216314"/>
+                <a:gd name="connsiteX5" fmla="*/ 25449 w 458077"/>
+                <a:gd name="connsiteY5" fmla="*/ 25449 h 216314"/>
+                <a:gd name="connsiteX6" fmla="*/ 432629 w 458077"/>
+                <a:gd name="connsiteY6" fmla="*/ 25449 h 216314"/>
+                <a:gd name="connsiteX7" fmla="*/ 432629 w 458077"/>
+                <a:gd name="connsiteY7" fmla="*/ 216315 h 216314"/>
+                <a:gd name="connsiteX8" fmla="*/ 458078 w 458077"/>
+                <a:gd name="connsiteY8" fmla="*/ 216315 h 216314"/>
               </a:gdLst>
               <a:ahLst/>
               <a:cxnLst>
@@ -3622,95 +3630,95 @@
               </a:cxnLst>
               <a:rect l="l" t="t" r="r" b="b"/>
               <a:pathLst>
-                <a:path w="699558" h="353711" fill="none" extrusionOk="0">
+                <a:path w="458077" h="216314" fill="none" extrusionOk="0">
                   <a:moveTo>
-                    <a:pt x="699559" y="353712"/>
+                    <a:pt x="458078" y="216315"/>
                   </a:moveTo>
                   <a:cubicBezTo>
-                    <a:pt x="701130" y="190712"/>
-                    <a:pt x="701108" y="169811"/>
-                    <a:pt x="699559" y="0"/>
-                  </a:cubicBezTo>
-                  <a:cubicBezTo>
-                    <a:pt x="500862" y="-29226"/>
-                    <a:pt x="201298" y="14060"/>
+                    <a:pt x="458251" y="157782"/>
+                    <a:pt x="458207" y="94350"/>
+                    <a:pt x="458078" y="0"/>
+                  </a:cubicBezTo>
+                  <a:cubicBezTo>
+                    <a:pt x="281106" y="11404"/>
+                    <a:pt x="125911" y="-6240"/>
                     <a:pt x="0" y="0"/>
                   </a:cubicBezTo>
                   <a:cubicBezTo>
-                    <a:pt x="-3078" y="149422"/>
-                    <a:pt x="-8677" y="181369"/>
-                    <a:pt x="0" y="353712"/>
-                  </a:cubicBezTo>
-                  <a:cubicBezTo>
-                    <a:pt x="18089" y="352708"/>
-                    <a:pt x="19519" y="351803"/>
-                    <a:pt x="38864" y="353712"/>
-                  </a:cubicBezTo>
-                  <a:cubicBezTo>
-                    <a:pt x="45357" y="275805"/>
-                    <a:pt x="44416" y="169659"/>
-                    <a:pt x="38864" y="41613"/>
-                  </a:cubicBezTo>
-                  <a:cubicBezTo>
-                    <a:pt x="243655" y="10958"/>
-                    <a:pt x="367544" y="66743"/>
-                    <a:pt x="660694" y="41613"/>
-                  </a:cubicBezTo>
-                  <a:cubicBezTo>
-                    <a:pt x="646586" y="166226"/>
-                    <a:pt x="650501" y="216179"/>
-                    <a:pt x="660694" y="353712"/>
-                  </a:cubicBezTo>
-                  <a:cubicBezTo>
-                    <a:pt x="674016" y="354258"/>
-                    <a:pt x="683682" y="353469"/>
-                    <a:pt x="699559" y="353712"/>
+                    <a:pt x="3846" y="84471"/>
+                    <a:pt x="-8295" y="138909"/>
+                    <a:pt x="0" y="216315"/>
+                  </a:cubicBezTo>
+                  <a:cubicBezTo>
+                    <a:pt x="5131" y="215730"/>
+                    <a:pt x="14494" y="216746"/>
+                    <a:pt x="25449" y="216315"/>
+                  </a:cubicBezTo>
+                  <a:cubicBezTo>
+                    <a:pt x="29524" y="146828"/>
+                    <a:pt x="24016" y="102541"/>
+                    <a:pt x="25449" y="25449"/>
+                  </a:cubicBezTo>
+                  <a:cubicBezTo>
+                    <a:pt x="219455" y="15856"/>
+                    <a:pt x="340714" y="17927"/>
+                    <a:pt x="432629" y="25449"/>
+                  </a:cubicBezTo>
+                  <a:cubicBezTo>
+                    <a:pt x="432171" y="107889"/>
+                    <a:pt x="428483" y="154505"/>
+                    <a:pt x="432629" y="216315"/>
+                  </a:cubicBezTo>
+                  <a:cubicBezTo>
+                    <a:pt x="442994" y="216878"/>
+                    <a:pt x="449235" y="216264"/>
+                    <a:pt x="458078" y="216315"/>
                   </a:cubicBezTo>
                   <a:close/>
                 </a:path>
-                <a:path w="699558" h="353711" stroke="0" extrusionOk="0">
+                <a:path w="458077" h="216314" stroke="0" extrusionOk="0">
                   <a:moveTo>
-                    <a:pt x="699559" y="353712"/>
+                    <a:pt x="458078" y="216315"/>
                   </a:moveTo>
                   <a:cubicBezTo>
-                    <a:pt x="706548" y="183391"/>
-                    <a:pt x="703881" y="121120"/>
-                    <a:pt x="699559" y="0"/>
-                  </a:cubicBezTo>
-                  <a:cubicBezTo>
-                    <a:pt x="557513" y="-11032"/>
-                    <a:pt x="180911" y="-28475"/>
+                    <a:pt x="466823" y="158748"/>
+                    <a:pt x="459185" y="85792"/>
+                    <a:pt x="458078" y="0"/>
+                  </a:cubicBezTo>
+                  <a:cubicBezTo>
+                    <a:pt x="294946" y="-17379"/>
+                    <a:pt x="178115" y="-509"/>
                     <a:pt x="0" y="0"/>
                   </a:cubicBezTo>
                   <a:cubicBezTo>
-                    <a:pt x="11665" y="140563"/>
-                    <a:pt x="-13224" y="261377"/>
-                    <a:pt x="0" y="353712"/>
-                  </a:cubicBezTo>
-                  <a:cubicBezTo>
-                    <a:pt x="17478" y="352160"/>
-                    <a:pt x="29633" y="352455"/>
-                    <a:pt x="38864" y="353712"/>
-                  </a:cubicBezTo>
-                  <a:cubicBezTo>
-                    <a:pt x="35249" y="249128"/>
-                    <a:pt x="24226" y="114825"/>
-                    <a:pt x="38864" y="41613"/>
-                  </a:cubicBezTo>
-                  <a:cubicBezTo>
-                    <a:pt x="201206" y="69060"/>
-                    <a:pt x="521115" y="32285"/>
-                    <a:pt x="660694" y="41613"/>
-                  </a:cubicBezTo>
-                  <a:cubicBezTo>
-                    <a:pt x="675279" y="165623"/>
-                    <a:pt x="649300" y="277396"/>
-                    <a:pt x="660694" y="353712"/>
-                  </a:cubicBezTo>
-                  <a:cubicBezTo>
-                    <a:pt x="678882" y="353361"/>
-                    <a:pt x="689631" y="354670"/>
-                    <a:pt x="699559" y="353712"/>
+                    <a:pt x="4853" y="89757"/>
+                    <a:pt x="5572" y="172711"/>
+                    <a:pt x="0" y="216315"/>
+                  </a:cubicBezTo>
+                  <a:cubicBezTo>
+                    <a:pt x="10889" y="215884"/>
+                    <a:pt x="17605" y="215596"/>
+                    <a:pt x="25449" y="216315"/>
+                  </a:cubicBezTo>
+                  <a:cubicBezTo>
+                    <a:pt x="33701" y="136975"/>
+                    <a:pt x="18292" y="76501"/>
+                    <a:pt x="25449" y="25449"/>
+                  </a:cubicBezTo>
+                  <a:cubicBezTo>
+                    <a:pt x="176956" y="27509"/>
+                    <a:pt x="305700" y="20307"/>
+                    <a:pt x="432629" y="25449"/>
+                  </a:cubicBezTo>
+                  <a:cubicBezTo>
+                    <a:pt x="429374" y="90894"/>
+                    <a:pt x="423551" y="144574"/>
+                    <a:pt x="432629" y="216315"/>
+                  </a:cubicBezTo>
+                  <a:cubicBezTo>
+                    <a:pt x="442038" y="216012"/>
+                    <a:pt x="446419" y="216304"/>
+                    <a:pt x="458078" y="216315"/>
                   </a:cubicBezTo>
                   <a:close/>
                 </a:path>
@@ -3850,60 +3858,52 @@
             <a:custGeom>
               <a:avLst/>
               <a:gdLst>
-                <a:gd name="connsiteX0" fmla="*/ 1476846 w 1554574"/>
-                <a:gd name="connsiteY0" fmla="*/ 0 h 1019522"/>
-                <a:gd name="connsiteX1" fmla="*/ 763296 w 1554574"/>
-                <a:gd name="connsiteY1" fmla="*/ 0 h 1019522"/>
-                <a:gd name="connsiteX2" fmla="*/ 77729 w 1554574"/>
-                <a:gd name="connsiteY2" fmla="*/ 0 h 1019522"/>
-                <a:gd name="connsiteX3" fmla="*/ 0 w 1554574"/>
-                <a:gd name="connsiteY3" fmla="*/ 83227 h 1019522"/>
-                <a:gd name="connsiteX4" fmla="*/ 0 w 1554574"/>
-                <a:gd name="connsiteY4" fmla="*/ 518292 h 1019522"/>
-                <a:gd name="connsiteX5" fmla="*/ 0 w 1554574"/>
-                <a:gd name="connsiteY5" fmla="*/ 936296 h 1019522"/>
-                <a:gd name="connsiteX6" fmla="*/ 77729 w 1554574"/>
-                <a:gd name="connsiteY6" fmla="*/ 1019523 h 1019522"/>
-                <a:gd name="connsiteX7" fmla="*/ 434872 w 1554574"/>
-                <a:gd name="connsiteY7" fmla="*/ 1019523 h 1019522"/>
-                <a:gd name="connsiteX8" fmla="*/ 428712 w 1554574"/>
-                <a:gd name="connsiteY8" fmla="*/ 977910 h 1019522"/>
-                <a:gd name="connsiteX9" fmla="*/ 77729 w 1554574"/>
-                <a:gd name="connsiteY9" fmla="*/ 977910 h 1019522"/>
-                <a:gd name="connsiteX10" fmla="*/ 38864 w 1554574"/>
-                <a:gd name="connsiteY10" fmla="*/ 936296 h 1019522"/>
-                <a:gd name="connsiteX11" fmla="*/ 38864 w 1554574"/>
-                <a:gd name="connsiteY11" fmla="*/ 509762 h 1019522"/>
-                <a:gd name="connsiteX12" fmla="*/ 38864 w 1554574"/>
-                <a:gd name="connsiteY12" fmla="*/ 83227 h 1019522"/>
-                <a:gd name="connsiteX13" fmla="*/ 77729 w 1554574"/>
-                <a:gd name="connsiteY13" fmla="*/ 41613 h 1019522"/>
-                <a:gd name="connsiteX14" fmla="*/ 749305 w 1554574"/>
-                <a:gd name="connsiteY14" fmla="*/ 41613 h 1019522"/>
-                <a:gd name="connsiteX15" fmla="*/ 1476846 w 1554574"/>
-                <a:gd name="connsiteY15" fmla="*/ 41613 h 1019522"/>
-                <a:gd name="connsiteX16" fmla="*/ 1515710 w 1554574"/>
-                <a:gd name="connsiteY16" fmla="*/ 83227 h 1019522"/>
-                <a:gd name="connsiteX17" fmla="*/ 1515710 w 1554574"/>
-                <a:gd name="connsiteY17" fmla="*/ 492700 h 1019522"/>
-                <a:gd name="connsiteX18" fmla="*/ 1515710 w 1554574"/>
-                <a:gd name="connsiteY18" fmla="*/ 936296 h 1019522"/>
-                <a:gd name="connsiteX19" fmla="*/ 1476846 w 1554574"/>
-                <a:gd name="connsiteY19" fmla="*/ 977910 h 1019522"/>
-                <a:gd name="connsiteX20" fmla="*/ 1131828 w 1554574"/>
-                <a:gd name="connsiteY20" fmla="*/ 977910 h 1019522"/>
-                <a:gd name="connsiteX21" fmla="*/ 1125707 w 1554574"/>
-                <a:gd name="connsiteY21" fmla="*/ 1019523 h 1019522"/>
-                <a:gd name="connsiteX22" fmla="*/ 1476846 w 1554574"/>
-                <a:gd name="connsiteY22" fmla="*/ 1019523 h 1019522"/>
-                <a:gd name="connsiteX23" fmla="*/ 1554575 w 1554574"/>
-                <a:gd name="connsiteY23" fmla="*/ 936296 h 1019522"/>
-                <a:gd name="connsiteX24" fmla="*/ 1554575 w 1554574"/>
-                <a:gd name="connsiteY24" fmla="*/ 526823 h 1019522"/>
-                <a:gd name="connsiteX25" fmla="*/ 1554575 w 1554574"/>
-                <a:gd name="connsiteY25" fmla="*/ 83227 h 1019522"/>
-                <a:gd name="connsiteX26" fmla="*/ 1476846 w 1554574"/>
-                <a:gd name="connsiteY26" fmla="*/ 0 h 1019522"/>
+                <a:gd name="connsiteX0" fmla="*/ 967053 w 1017950"/>
+                <a:gd name="connsiteY0" fmla="*/ 0 h 623494"/>
+                <a:gd name="connsiteX1" fmla="*/ 508976 w 1017950"/>
+                <a:gd name="connsiteY1" fmla="*/ 0 h 623494"/>
+                <a:gd name="connsiteX2" fmla="*/ 50898 w 1017950"/>
+                <a:gd name="connsiteY2" fmla="*/ 0 h 623494"/>
+                <a:gd name="connsiteX3" fmla="*/ 0 w 1017950"/>
+                <a:gd name="connsiteY3" fmla="*/ 50898 h 623494"/>
+                <a:gd name="connsiteX4" fmla="*/ 0 w 1017950"/>
+                <a:gd name="connsiteY4" fmla="*/ 572597 h 623494"/>
+                <a:gd name="connsiteX5" fmla="*/ 50898 w 1017950"/>
+                <a:gd name="connsiteY5" fmla="*/ 623495 h 623494"/>
+                <a:gd name="connsiteX6" fmla="*/ 284759 w 1017950"/>
+                <a:gd name="connsiteY6" fmla="*/ 623495 h 623494"/>
+                <a:gd name="connsiteX7" fmla="*/ 280725 w 1017950"/>
+                <a:gd name="connsiteY7" fmla="*/ 598046 h 623494"/>
+                <a:gd name="connsiteX8" fmla="*/ 50898 w 1017950"/>
+                <a:gd name="connsiteY8" fmla="*/ 598046 h 623494"/>
+                <a:gd name="connsiteX9" fmla="*/ 25449 w 1017950"/>
+                <a:gd name="connsiteY9" fmla="*/ 572597 h 623494"/>
+                <a:gd name="connsiteX10" fmla="*/ 25449 w 1017950"/>
+                <a:gd name="connsiteY10" fmla="*/ 50898 h 623494"/>
+                <a:gd name="connsiteX11" fmla="*/ 50898 w 1017950"/>
+                <a:gd name="connsiteY11" fmla="*/ 25449 h 623494"/>
+                <a:gd name="connsiteX12" fmla="*/ 481491 w 1017950"/>
+                <a:gd name="connsiteY12" fmla="*/ 25449 h 623494"/>
+                <a:gd name="connsiteX13" fmla="*/ 967053 w 1017950"/>
+                <a:gd name="connsiteY13" fmla="*/ 25449 h 623494"/>
+                <a:gd name="connsiteX14" fmla="*/ 992502 w 1017950"/>
+                <a:gd name="connsiteY14" fmla="*/ 50898 h 623494"/>
+                <a:gd name="connsiteX15" fmla="*/ 992502 w 1017950"/>
+                <a:gd name="connsiteY15" fmla="*/ 572597 h 623494"/>
+                <a:gd name="connsiteX16" fmla="*/ 967053 w 1017950"/>
+                <a:gd name="connsiteY16" fmla="*/ 598046 h 623494"/>
+                <a:gd name="connsiteX17" fmla="*/ 741132 w 1017950"/>
+                <a:gd name="connsiteY17" fmla="*/ 598046 h 623494"/>
+                <a:gd name="connsiteX18" fmla="*/ 737124 w 1017950"/>
+                <a:gd name="connsiteY18" fmla="*/ 623495 h 623494"/>
+                <a:gd name="connsiteX19" fmla="*/ 967053 w 1017950"/>
+                <a:gd name="connsiteY19" fmla="*/ 623495 h 623494"/>
+                <a:gd name="connsiteX20" fmla="*/ 1017951 w 1017950"/>
+                <a:gd name="connsiteY20" fmla="*/ 572597 h 623494"/>
+                <a:gd name="connsiteX21" fmla="*/ 1017951 w 1017950"/>
+                <a:gd name="connsiteY21" fmla="*/ 50898 h 623494"/>
+                <a:gd name="connsiteX22" fmla="*/ 967053 w 1017950"/>
+                <a:gd name="connsiteY22" fmla="*/ 0 h 623494"/>
               </a:gdLst>
               <a:ahLst/>
               <a:cxnLst>
@@ -3976,290 +3976,238 @@
                 <a:cxn ang="0">
                   <a:pos x="connsiteX22" y="connsiteY22"/>
                 </a:cxn>
-                <a:cxn ang="0">
-                  <a:pos x="connsiteX23" y="connsiteY23"/>
-                </a:cxn>
-                <a:cxn ang="0">
-                  <a:pos x="connsiteX24" y="connsiteY24"/>
-                </a:cxn>
-                <a:cxn ang="0">
-                  <a:pos x="connsiteX25" y="connsiteY25"/>
-                </a:cxn>
-                <a:cxn ang="0">
-                  <a:pos x="connsiteX26" y="connsiteY26"/>
-                </a:cxn>
               </a:cxnLst>
               <a:rect l="l" t="t" r="r" b="b"/>
               <a:pathLst>
-                <a:path w="1554574" h="1019522" fill="none" extrusionOk="0">
+                <a:path w="1017950" h="623494" fill="none" extrusionOk="0">
                   <a:moveTo>
-                    <a:pt x="1476846" y="0"/>
+                    <a:pt x="967053" y="0"/>
                   </a:moveTo>
                   <a:cubicBezTo>
-                    <a:pt x="1128857" y="1000"/>
-                    <a:pt x="926084" y="-28978"/>
-                    <a:pt x="763296" y="0"/>
-                  </a:cubicBezTo>
-                  <a:cubicBezTo>
-                    <a:pt x="600508" y="28978"/>
-                    <a:pt x="404728" y="13929"/>
-                    <a:pt x="77729" y="0"/>
-                  </a:cubicBezTo>
-                  <a:cubicBezTo>
-                    <a:pt x="26937" y="4695"/>
-                    <a:pt x="6097" y="46190"/>
-                    <a:pt x="0" y="83227"/>
-                  </a:cubicBezTo>
-                  <a:cubicBezTo>
-                    <a:pt x="-452" y="279681"/>
-                    <a:pt x="-14316" y="398544"/>
-                    <a:pt x="0" y="518292"/>
-                  </a:cubicBezTo>
-                  <a:cubicBezTo>
-                    <a:pt x="14316" y="638040"/>
-                    <a:pt x="-10214" y="763426"/>
-                    <a:pt x="0" y="936296"/>
-                  </a:cubicBezTo>
-                  <a:cubicBezTo>
-                    <a:pt x="-8063" y="985852"/>
-                    <a:pt x="31341" y="1020804"/>
-                    <a:pt x="77729" y="1019523"/>
-                  </a:cubicBezTo>
-                  <a:cubicBezTo>
-                    <a:pt x="238278" y="1017977"/>
-                    <a:pt x="299519" y="1017633"/>
-                    <a:pt x="434872" y="1019523"/>
-                  </a:cubicBezTo>
-                  <a:cubicBezTo>
-                    <a:pt x="431195" y="1007031"/>
-                    <a:pt x="431143" y="989437"/>
-                    <a:pt x="428712" y="977910"/>
-                  </a:cubicBezTo>
-                  <a:cubicBezTo>
-                    <a:pt x="355937" y="990324"/>
-                    <a:pt x="165225" y="965908"/>
-                    <a:pt x="77729" y="977910"/>
-                  </a:cubicBezTo>
-                  <a:cubicBezTo>
-                    <a:pt x="59559" y="981604"/>
-                    <a:pt x="39224" y="961308"/>
-                    <a:pt x="38864" y="936296"/>
-                  </a:cubicBezTo>
-                  <a:cubicBezTo>
-                    <a:pt x="52047" y="812046"/>
-                    <a:pt x="49351" y="623677"/>
-                    <a:pt x="38864" y="509762"/>
-                  </a:cubicBezTo>
-                  <a:cubicBezTo>
-                    <a:pt x="28377" y="395847"/>
-                    <a:pt x="41566" y="255993"/>
-                    <a:pt x="38864" y="83227"/>
-                  </a:cubicBezTo>
-                  <a:cubicBezTo>
-                    <a:pt x="41285" y="57281"/>
-                    <a:pt x="57902" y="40737"/>
-                    <a:pt x="77729" y="41613"/>
-                  </a:cubicBezTo>
-                  <a:cubicBezTo>
-                    <a:pt x="251910" y="61932"/>
-                    <a:pt x="450999" y="22827"/>
-                    <a:pt x="749305" y="41613"/>
-                  </a:cubicBezTo>
-                  <a:cubicBezTo>
-                    <a:pt x="1047611" y="60399"/>
-                    <a:pt x="1117897" y="13791"/>
-                    <a:pt x="1476846" y="41613"/>
-                  </a:cubicBezTo>
-                  <a:cubicBezTo>
-                    <a:pt x="1495046" y="38239"/>
-                    <a:pt x="1518948" y="60331"/>
-                    <a:pt x="1515710" y="83227"/>
-                  </a:cubicBezTo>
-                  <a:cubicBezTo>
-                    <a:pt x="1525937" y="276328"/>
-                    <a:pt x="1509084" y="323442"/>
-                    <a:pt x="1515710" y="492700"/>
-                  </a:cubicBezTo>
-                  <a:cubicBezTo>
-                    <a:pt x="1522336" y="661958"/>
-                    <a:pt x="1525009" y="814008"/>
-                    <a:pt x="1515710" y="936296"/>
-                  </a:cubicBezTo>
-                  <a:cubicBezTo>
-                    <a:pt x="1516887" y="963908"/>
-                    <a:pt x="1497083" y="976115"/>
-                    <a:pt x="1476846" y="977910"/>
-                  </a:cubicBezTo>
-                  <a:cubicBezTo>
-                    <a:pt x="1348670" y="968521"/>
-                    <a:pt x="1209033" y="966441"/>
-                    <a:pt x="1131828" y="977910"/>
-                  </a:cubicBezTo>
-                  <a:cubicBezTo>
-                    <a:pt x="1129352" y="994463"/>
-                    <a:pt x="1126126" y="1002944"/>
-                    <a:pt x="1125707" y="1019523"/>
-                  </a:cubicBezTo>
-                  <a:cubicBezTo>
-                    <a:pt x="1285309" y="1022713"/>
-                    <a:pt x="1311710" y="1002031"/>
-                    <a:pt x="1476846" y="1019523"/>
-                  </a:cubicBezTo>
-                  <a:cubicBezTo>
-                    <a:pt x="1515864" y="1014122"/>
-                    <a:pt x="1558338" y="978118"/>
-                    <a:pt x="1554575" y="936296"/>
-                  </a:cubicBezTo>
-                  <a:cubicBezTo>
-                    <a:pt x="1556751" y="752811"/>
-                    <a:pt x="1545748" y="711579"/>
-                    <a:pt x="1554575" y="526823"/>
-                  </a:cubicBezTo>
-                  <a:cubicBezTo>
-                    <a:pt x="1563402" y="342067"/>
-                    <a:pt x="1539728" y="236563"/>
-                    <a:pt x="1554575" y="83227"/>
-                  </a:cubicBezTo>
-                  <a:cubicBezTo>
-                    <a:pt x="1544063" y="37269"/>
-                    <a:pt x="1518802" y="-1042"/>
-                    <a:pt x="1476846" y="0"/>
+                    <a:pt x="829833" y="-5279"/>
+                    <a:pt x="661740" y="12840"/>
+                    <a:pt x="508976" y="0"/>
+                  </a:cubicBezTo>
+                  <a:cubicBezTo>
+                    <a:pt x="356212" y="-12840"/>
+                    <a:pt x="183396" y="20145"/>
+                    <a:pt x="50898" y="0"/>
+                  </a:cubicBezTo>
+                  <a:cubicBezTo>
+                    <a:pt x="25128" y="-955"/>
+                    <a:pt x="-775" y="22989"/>
+                    <a:pt x="0" y="50898"/>
+                  </a:cubicBezTo>
+                  <a:cubicBezTo>
+                    <a:pt x="23417" y="287289"/>
+                    <a:pt x="17474" y="368544"/>
+                    <a:pt x="0" y="572597"/>
+                  </a:cubicBezTo>
+                  <a:cubicBezTo>
+                    <a:pt x="444" y="601302"/>
+                    <a:pt x="29232" y="622236"/>
+                    <a:pt x="50898" y="623495"/>
+                  </a:cubicBezTo>
+                  <a:cubicBezTo>
+                    <a:pt x="116298" y="625355"/>
+                    <a:pt x="237216" y="614148"/>
+                    <a:pt x="284759" y="623495"/>
+                  </a:cubicBezTo>
+                  <a:cubicBezTo>
+                    <a:pt x="282687" y="613551"/>
+                    <a:pt x="281633" y="606156"/>
+                    <a:pt x="280725" y="598046"/>
+                  </a:cubicBezTo>
+                  <a:cubicBezTo>
+                    <a:pt x="184280" y="589036"/>
+                    <a:pt x="116228" y="594158"/>
+                    <a:pt x="50898" y="598046"/>
+                  </a:cubicBezTo>
+                  <a:cubicBezTo>
+                    <a:pt x="36479" y="598323"/>
+                    <a:pt x="26377" y="587906"/>
+                    <a:pt x="25449" y="572597"/>
+                  </a:cubicBezTo>
+                  <a:cubicBezTo>
+                    <a:pt x="21690" y="439211"/>
+                    <a:pt x="28095" y="310061"/>
+                    <a:pt x="25449" y="50898"/>
+                  </a:cubicBezTo>
+                  <a:cubicBezTo>
+                    <a:pt x="25938" y="37625"/>
+                    <a:pt x="37879" y="23621"/>
+                    <a:pt x="50898" y="25449"/>
+                  </a:cubicBezTo>
+                  <a:cubicBezTo>
+                    <a:pt x="206379" y="37328"/>
+                    <a:pt x="362984" y="26434"/>
+                    <a:pt x="481491" y="25449"/>
+                  </a:cubicBezTo>
+                  <a:cubicBezTo>
+                    <a:pt x="599998" y="24464"/>
+                    <a:pt x="829772" y="29726"/>
+                    <a:pt x="967053" y="25449"/>
+                  </a:cubicBezTo>
+                  <a:cubicBezTo>
+                    <a:pt x="981160" y="26016"/>
+                    <a:pt x="994421" y="35835"/>
+                    <a:pt x="992502" y="50898"/>
+                  </a:cubicBezTo>
+                  <a:cubicBezTo>
+                    <a:pt x="1011529" y="275133"/>
+                    <a:pt x="973498" y="384366"/>
+                    <a:pt x="992502" y="572597"/>
+                  </a:cubicBezTo>
+                  <a:cubicBezTo>
+                    <a:pt x="994769" y="587902"/>
+                    <a:pt x="983082" y="600497"/>
+                    <a:pt x="967053" y="598046"/>
+                  </a:cubicBezTo>
+                  <a:cubicBezTo>
+                    <a:pt x="893407" y="607701"/>
+                    <a:pt x="850305" y="595277"/>
+                    <a:pt x="741132" y="598046"/>
+                  </a:cubicBezTo>
+                  <a:cubicBezTo>
+                    <a:pt x="740285" y="610307"/>
+                    <a:pt x="738308" y="612245"/>
+                    <a:pt x="737124" y="623495"/>
+                  </a:cubicBezTo>
+                  <a:cubicBezTo>
+                    <a:pt x="793179" y="619127"/>
+                    <a:pt x="856301" y="629565"/>
+                    <a:pt x="967053" y="623495"/>
+                  </a:cubicBezTo>
+                  <a:cubicBezTo>
+                    <a:pt x="996305" y="619556"/>
+                    <a:pt x="1018584" y="603199"/>
+                    <a:pt x="1017951" y="572597"/>
+                  </a:cubicBezTo>
+                  <a:cubicBezTo>
+                    <a:pt x="1032339" y="401093"/>
+                    <a:pt x="1027771" y="290674"/>
+                    <a:pt x="1017951" y="50898"/>
+                  </a:cubicBezTo>
+                  <a:cubicBezTo>
+                    <a:pt x="1022819" y="18488"/>
+                    <a:pt x="1000302" y="-3737"/>
+                    <a:pt x="967053" y="0"/>
                   </a:cubicBezTo>
                   <a:close/>
                 </a:path>
-                <a:path w="1554574" h="1019522" stroke="0" extrusionOk="0">
+                <a:path w="1017950" h="623494" stroke="0" extrusionOk="0">
                   <a:moveTo>
-                    <a:pt x="1476846" y="0"/>
+                    <a:pt x="967053" y="0"/>
                   </a:moveTo>
                   <a:cubicBezTo>
-                    <a:pt x="1151271" y="-14581"/>
-                    <a:pt x="965437" y="18910"/>
-                    <a:pt x="805270" y="0"/>
-                  </a:cubicBezTo>
-                  <a:cubicBezTo>
-                    <a:pt x="645103" y="-18910"/>
-                    <a:pt x="373731" y="-16798"/>
-                    <a:pt x="77729" y="0"/>
-                  </a:cubicBezTo>
-                  <a:cubicBezTo>
-                    <a:pt x="31915" y="-221"/>
-                    <a:pt x="-4663" y="44169"/>
-                    <a:pt x="0" y="83227"/>
-                  </a:cubicBezTo>
-                  <a:cubicBezTo>
-                    <a:pt x="14442" y="270475"/>
-                    <a:pt x="20191" y="348112"/>
-                    <a:pt x="0" y="509762"/>
-                  </a:cubicBezTo>
-                  <a:cubicBezTo>
-                    <a:pt x="-20191" y="671413"/>
-                    <a:pt x="-9917" y="833677"/>
-                    <a:pt x="0" y="936296"/>
-                  </a:cubicBezTo>
-                  <a:cubicBezTo>
-                    <a:pt x="7772" y="979196"/>
-                    <a:pt x="39831" y="1013601"/>
-                    <a:pt x="77729" y="1019523"/>
-                  </a:cubicBezTo>
-                  <a:cubicBezTo>
-                    <a:pt x="255122" y="1037145"/>
-                    <a:pt x="320348" y="1017132"/>
-                    <a:pt x="434872" y="1019523"/>
-                  </a:cubicBezTo>
-                  <a:cubicBezTo>
-                    <a:pt x="433911" y="1004367"/>
-                    <a:pt x="428160" y="987247"/>
-                    <a:pt x="428712" y="977910"/>
-                  </a:cubicBezTo>
-                  <a:cubicBezTo>
-                    <a:pt x="289661" y="971873"/>
-                    <a:pt x="250727" y="991541"/>
-                    <a:pt x="77729" y="977910"/>
-                  </a:cubicBezTo>
-                  <a:cubicBezTo>
-                    <a:pt x="55588" y="980794"/>
-                    <a:pt x="34955" y="955894"/>
-                    <a:pt x="38864" y="936296"/>
-                  </a:cubicBezTo>
-                  <a:cubicBezTo>
-                    <a:pt x="44623" y="830668"/>
-                    <a:pt x="24849" y="679594"/>
-                    <a:pt x="38864" y="535354"/>
-                  </a:cubicBezTo>
-                  <a:cubicBezTo>
-                    <a:pt x="52879" y="391114"/>
-                    <a:pt x="30893" y="232187"/>
-                    <a:pt x="38864" y="83227"/>
-                  </a:cubicBezTo>
-                  <a:cubicBezTo>
-                    <a:pt x="40224" y="61999"/>
-                    <a:pt x="56402" y="36537"/>
-                    <a:pt x="77729" y="41613"/>
-                  </a:cubicBezTo>
-                  <a:cubicBezTo>
-                    <a:pt x="254891" y="45459"/>
-                    <a:pt x="524888" y="68556"/>
-                    <a:pt x="735314" y="41613"/>
-                  </a:cubicBezTo>
-                  <a:cubicBezTo>
-                    <a:pt x="945741" y="14670"/>
-                    <a:pt x="1154975" y="68945"/>
-                    <a:pt x="1476846" y="41613"/>
-                  </a:cubicBezTo>
-                  <a:cubicBezTo>
-                    <a:pt x="1494913" y="36996"/>
-                    <a:pt x="1519918" y="62698"/>
-                    <a:pt x="1515710" y="83227"/>
-                  </a:cubicBezTo>
-                  <a:cubicBezTo>
-                    <a:pt x="1532685" y="182651"/>
-                    <a:pt x="1531639" y="336677"/>
-                    <a:pt x="1515710" y="518292"/>
-                  </a:cubicBezTo>
-                  <a:cubicBezTo>
-                    <a:pt x="1499781" y="699907"/>
-                    <a:pt x="1528757" y="802412"/>
-                    <a:pt x="1515710" y="936296"/>
-                  </a:cubicBezTo>
-                  <a:cubicBezTo>
-                    <a:pt x="1512187" y="955891"/>
-                    <a:pt x="1500203" y="973466"/>
-                    <a:pt x="1476846" y="977910"/>
-                  </a:cubicBezTo>
-                  <a:cubicBezTo>
-                    <a:pt x="1308078" y="962401"/>
-                    <a:pt x="1220650" y="981472"/>
-                    <a:pt x="1131828" y="977910"/>
-                  </a:cubicBezTo>
-                  <a:cubicBezTo>
-                    <a:pt x="1129056" y="994862"/>
-                    <a:pt x="1127034" y="1004956"/>
-                    <a:pt x="1125707" y="1019523"/>
-                  </a:cubicBezTo>
-                  <a:cubicBezTo>
-                    <a:pt x="1276112" y="1033140"/>
-                    <a:pt x="1369379" y="1022485"/>
-                    <a:pt x="1476846" y="1019523"/>
-                  </a:cubicBezTo>
-                  <a:cubicBezTo>
-                    <a:pt x="1518042" y="1022566"/>
-                    <a:pt x="1559712" y="981704"/>
-                    <a:pt x="1554575" y="936296"/>
-                  </a:cubicBezTo>
-                  <a:cubicBezTo>
-                    <a:pt x="1542087" y="769937"/>
-                    <a:pt x="1572967" y="643013"/>
-                    <a:pt x="1554575" y="509762"/>
-                  </a:cubicBezTo>
-                  <a:cubicBezTo>
-                    <a:pt x="1536183" y="376511"/>
-                    <a:pt x="1543630" y="289380"/>
-                    <a:pt x="1554575" y="83227"/>
-                  </a:cubicBezTo>
-                  <a:cubicBezTo>
-                    <a:pt x="1561192" y="34561"/>
-                    <a:pt x="1513602" y="1598"/>
-                    <a:pt x="1476846" y="0"/>
+                    <a:pt x="860342" y="-2084"/>
+                    <a:pt x="690763" y="-8143"/>
+                    <a:pt x="527299" y="0"/>
+                  </a:cubicBezTo>
+                  <a:cubicBezTo>
+                    <a:pt x="363835" y="8143"/>
+                    <a:pt x="230928" y="-7763"/>
+                    <a:pt x="50898" y="0"/>
+                  </a:cubicBezTo>
+                  <a:cubicBezTo>
+                    <a:pt x="15871" y="-530"/>
+                    <a:pt x="-1330" y="24758"/>
+                    <a:pt x="0" y="50898"/>
+                  </a:cubicBezTo>
+                  <a:cubicBezTo>
+                    <a:pt x="6573" y="279172"/>
+                    <a:pt x="10987" y="378635"/>
+                    <a:pt x="0" y="572597"/>
+                  </a:cubicBezTo>
+                  <a:cubicBezTo>
+                    <a:pt x="-2729" y="604445"/>
+                    <a:pt x="23984" y="622963"/>
+                    <a:pt x="50898" y="623495"/>
+                  </a:cubicBezTo>
+                  <a:cubicBezTo>
+                    <a:pt x="120506" y="613156"/>
+                    <a:pt x="231788" y="623932"/>
+                    <a:pt x="284759" y="623495"/>
+                  </a:cubicBezTo>
+                  <a:cubicBezTo>
+                    <a:pt x="282625" y="614478"/>
+                    <a:pt x="282706" y="603368"/>
+                    <a:pt x="280725" y="598046"/>
+                  </a:cubicBezTo>
+                  <a:cubicBezTo>
+                    <a:pt x="212793" y="596031"/>
+                    <a:pt x="102910" y="591125"/>
+                    <a:pt x="50898" y="598046"/>
+                  </a:cubicBezTo>
+                  <a:cubicBezTo>
+                    <a:pt x="37338" y="598077"/>
+                    <a:pt x="26449" y="584195"/>
+                    <a:pt x="25449" y="572597"/>
+                  </a:cubicBezTo>
+                  <a:cubicBezTo>
+                    <a:pt x="41519" y="347609"/>
+                    <a:pt x="11674" y="194224"/>
+                    <a:pt x="25449" y="50898"/>
+                  </a:cubicBezTo>
+                  <a:cubicBezTo>
+                    <a:pt x="23923" y="35615"/>
+                    <a:pt x="38709" y="25744"/>
+                    <a:pt x="50898" y="25449"/>
+                  </a:cubicBezTo>
+                  <a:cubicBezTo>
+                    <a:pt x="276925" y="35277"/>
+                    <a:pt x="411375" y="35190"/>
+                    <a:pt x="518137" y="25449"/>
+                  </a:cubicBezTo>
+                  <a:cubicBezTo>
+                    <a:pt x="624899" y="15708"/>
+                    <a:pt x="850375" y="38868"/>
+                    <a:pt x="967053" y="25449"/>
+                  </a:cubicBezTo>
+                  <a:cubicBezTo>
+                    <a:pt x="980413" y="25254"/>
+                    <a:pt x="992857" y="37422"/>
+                    <a:pt x="992502" y="50898"/>
+                  </a:cubicBezTo>
+                  <a:cubicBezTo>
+                    <a:pt x="967982" y="178985"/>
+                    <a:pt x="969102" y="428061"/>
+                    <a:pt x="992502" y="572597"/>
+                  </a:cubicBezTo>
+                  <a:cubicBezTo>
+                    <a:pt x="992531" y="586037"/>
+                    <a:pt x="981110" y="596355"/>
+                    <a:pt x="967053" y="598046"/>
+                  </a:cubicBezTo>
+                  <a:cubicBezTo>
+                    <a:pt x="898617" y="603954"/>
+                    <a:pt x="794388" y="600936"/>
+                    <a:pt x="741132" y="598046"/>
+                  </a:cubicBezTo>
+                  <a:cubicBezTo>
+                    <a:pt x="740146" y="606711"/>
+                    <a:pt x="737790" y="615349"/>
+                    <a:pt x="737124" y="623495"/>
+                  </a:cubicBezTo>
+                  <a:cubicBezTo>
+                    <a:pt x="851191" y="632763"/>
+                    <a:pt x="907667" y="632235"/>
+                    <a:pt x="967053" y="623495"/>
+                  </a:cubicBezTo>
+                  <a:cubicBezTo>
+                    <a:pt x="992217" y="628453"/>
+                    <a:pt x="1024302" y="599657"/>
+                    <a:pt x="1017951" y="572597"/>
+                  </a:cubicBezTo>
+                  <a:cubicBezTo>
+                    <a:pt x="1004714" y="420045"/>
+                    <a:pt x="1024667" y="279174"/>
+                    <a:pt x="1017951" y="50898"/>
+                  </a:cubicBezTo>
+                  <a:cubicBezTo>
+                    <a:pt x="1015586" y="26945"/>
+                    <a:pt x="1001051" y="-639"/>
+                    <a:pt x="967053" y="0"/>
                   </a:cubicBezTo>
                   <a:close/>
                 </a:path>
@@ -4511,156 +4459,154 @@
             <a:custGeom>
               <a:avLst/>
               <a:gdLst>
-                <a:gd name="connsiteX0" fmla="*/ 755135 w 774567"/>
-                <a:gd name="connsiteY0" fmla="*/ 41613 h 645013"/>
-                <a:gd name="connsiteX1" fmla="*/ 774567 w 774567"/>
-                <a:gd name="connsiteY1" fmla="*/ 20805 h 645013"/>
-                <a:gd name="connsiteX2" fmla="*/ 755135 w 774567"/>
-                <a:gd name="connsiteY2" fmla="*/ 0 h 645013"/>
-                <a:gd name="connsiteX3" fmla="*/ 372569 w 774567"/>
-                <a:gd name="connsiteY3" fmla="*/ 0 h 645013"/>
-                <a:gd name="connsiteX4" fmla="*/ 19431 w 774567"/>
-                <a:gd name="connsiteY4" fmla="*/ 0 h 645013"/>
-                <a:gd name="connsiteX5" fmla="*/ 0 w 774567"/>
-                <a:gd name="connsiteY5" fmla="*/ 20805 h 645013"/>
-                <a:gd name="connsiteX6" fmla="*/ 19431 w 774567"/>
-                <a:gd name="connsiteY6" fmla="*/ 41613 h 645013"/>
-                <a:gd name="connsiteX7" fmla="*/ 70829 w 774567"/>
-                <a:gd name="connsiteY7" fmla="*/ 41613 h 645013"/>
-                <a:gd name="connsiteX8" fmla="*/ 151978 w 774567"/>
-                <a:gd name="connsiteY8" fmla="*/ 590908 h 645013"/>
-                <a:gd name="connsiteX9" fmla="*/ 172440 w 774567"/>
-                <a:gd name="connsiteY9" fmla="*/ 615875 h 645013"/>
-                <a:gd name="connsiteX10" fmla="*/ 180893 w 774567"/>
-                <a:gd name="connsiteY10" fmla="*/ 617206 h 645013"/>
-                <a:gd name="connsiteX11" fmla="*/ 202269 w 774567"/>
-                <a:gd name="connsiteY11" fmla="*/ 606970 h 645013"/>
-                <a:gd name="connsiteX12" fmla="*/ 270806 w 774567"/>
-                <a:gd name="connsiteY12" fmla="*/ 526407 h 645013"/>
-                <a:gd name="connsiteX13" fmla="*/ 360662 w 774567"/>
-                <a:gd name="connsiteY13" fmla="*/ 631480 h 645013"/>
-                <a:gd name="connsiteX14" fmla="*/ 415569 w 774567"/>
-                <a:gd name="connsiteY14" fmla="*/ 634111 h 645013"/>
-                <a:gd name="connsiteX15" fmla="*/ 418025 w 774567"/>
-                <a:gd name="connsiteY15" fmla="*/ 631480 h 645013"/>
-                <a:gd name="connsiteX16" fmla="*/ 507180 w 774567"/>
-                <a:gd name="connsiteY16" fmla="*/ 527051 h 645013"/>
-                <a:gd name="connsiteX17" fmla="*/ 575057 w 774567"/>
-                <a:gd name="connsiteY17" fmla="*/ 606908 h 645013"/>
-                <a:gd name="connsiteX18" fmla="*/ 596432 w 774567"/>
-                <a:gd name="connsiteY18" fmla="*/ 617144 h 645013"/>
-                <a:gd name="connsiteX19" fmla="*/ 604903 w 774567"/>
-                <a:gd name="connsiteY19" fmla="*/ 615813 h 645013"/>
-                <a:gd name="connsiteX20" fmla="*/ 625328 w 774567"/>
-                <a:gd name="connsiteY20" fmla="*/ 590844 h 645013"/>
-                <a:gd name="connsiteX21" fmla="*/ 706554 w 774567"/>
-                <a:gd name="connsiteY21" fmla="*/ 41613 h 645013"/>
-                <a:gd name="connsiteX22" fmla="*/ 755135 w 774567"/>
-                <a:gd name="connsiteY22" fmla="*/ 41613 h 645013"/>
-                <a:gd name="connsiteX23" fmla="*/ 443267 w 774567"/>
-                <a:gd name="connsiteY23" fmla="*/ 41613 h 645013"/>
-                <a:gd name="connsiteX24" fmla="*/ 630205 w 774567"/>
-                <a:gd name="connsiteY24" fmla="*/ 41613 h 645013"/>
-                <a:gd name="connsiteX25" fmla="*/ 506967 w 774567"/>
-                <a:gd name="connsiteY25" fmla="*/ 186635 h 645013"/>
-                <a:gd name="connsiteX26" fmla="*/ 413401 w 774567"/>
-                <a:gd name="connsiteY26" fmla="*/ 76588 h 645013"/>
-                <a:gd name="connsiteX27" fmla="*/ 443267 w 774567"/>
-                <a:gd name="connsiteY27" fmla="*/ 41613 h 645013"/>
-                <a:gd name="connsiteX28" fmla="*/ 360797 w 774567"/>
-                <a:gd name="connsiteY28" fmla="*/ 76526 h 645013"/>
-                <a:gd name="connsiteX29" fmla="*/ 268572 w 774567"/>
-                <a:gd name="connsiteY29" fmla="*/ 184554 h 645013"/>
-                <a:gd name="connsiteX30" fmla="*/ 147102 w 774567"/>
-                <a:gd name="connsiteY30" fmla="*/ 41613 h 645013"/>
-                <a:gd name="connsiteX31" fmla="*/ 331105 w 774567"/>
-                <a:gd name="connsiteY31" fmla="*/ 41613 h 645013"/>
-                <a:gd name="connsiteX32" fmla="*/ 360797 w 774567"/>
-                <a:gd name="connsiteY32" fmla="*/ 76526 h 645013"/>
-                <a:gd name="connsiteX33" fmla="*/ 242261 w 774567"/>
-                <a:gd name="connsiteY33" fmla="*/ 215390 h 645013"/>
-                <a:gd name="connsiteX34" fmla="*/ 151610 w 774567"/>
-                <a:gd name="connsiteY34" fmla="*/ 321503 h 645013"/>
-                <a:gd name="connsiteX35" fmla="*/ 113483 w 774567"/>
-                <a:gd name="connsiteY35" fmla="*/ 63897 h 645013"/>
-                <a:gd name="connsiteX36" fmla="*/ 242261 w 774567"/>
-                <a:gd name="connsiteY36" fmla="*/ 215390 h 645013"/>
-                <a:gd name="connsiteX37" fmla="*/ 268532 w 774567"/>
-                <a:gd name="connsiteY37" fmla="*/ 246308 h 645013"/>
-                <a:gd name="connsiteX38" fmla="*/ 362410 w 774567"/>
-                <a:gd name="connsiteY38" fmla="*/ 356770 h 645013"/>
-                <a:gd name="connsiteX39" fmla="*/ 270787 w 774567"/>
-                <a:gd name="connsiteY39" fmla="*/ 464590 h 645013"/>
-                <a:gd name="connsiteX40" fmla="*/ 176443 w 774567"/>
-                <a:gd name="connsiteY40" fmla="*/ 354128 h 645013"/>
-                <a:gd name="connsiteX41" fmla="*/ 268532 w 774567"/>
-                <a:gd name="connsiteY41" fmla="*/ 246308 h 645013"/>
-                <a:gd name="connsiteX42" fmla="*/ 294884 w 774567"/>
-                <a:gd name="connsiteY42" fmla="*/ 215452 h 645013"/>
-                <a:gd name="connsiteX43" fmla="*/ 387109 w 774567"/>
-                <a:gd name="connsiteY43" fmla="*/ 107445 h 645013"/>
-                <a:gd name="connsiteX44" fmla="*/ 480733 w 774567"/>
-                <a:gd name="connsiteY44" fmla="*/ 217553 h 645013"/>
-                <a:gd name="connsiteX45" fmla="*/ 388702 w 774567"/>
-                <a:gd name="connsiteY45" fmla="*/ 325748 h 645013"/>
-                <a:gd name="connsiteX46" fmla="*/ 294884 w 774567"/>
-                <a:gd name="connsiteY46" fmla="*/ 215452 h 645013"/>
-                <a:gd name="connsiteX47" fmla="*/ 507005 w 774567"/>
-                <a:gd name="connsiteY47" fmla="*/ 248451 h 645013"/>
-                <a:gd name="connsiteX48" fmla="*/ 599482 w 774567"/>
-                <a:gd name="connsiteY48" fmla="*/ 357207 h 645013"/>
-                <a:gd name="connsiteX49" fmla="*/ 507199 w 774567"/>
-                <a:gd name="connsiteY49" fmla="*/ 465297 h 645013"/>
-                <a:gd name="connsiteX50" fmla="*/ 414973 w 774567"/>
-                <a:gd name="connsiteY50" fmla="*/ 356749 h 645013"/>
-                <a:gd name="connsiteX51" fmla="*/ 507005 w 774567"/>
-                <a:gd name="connsiteY51" fmla="*/ 248451 h 645013"/>
-                <a:gd name="connsiteX52" fmla="*/ 625192 w 774567"/>
-                <a:gd name="connsiteY52" fmla="*/ 325623 h 645013"/>
-                <a:gd name="connsiteX53" fmla="*/ 533277 w 774567"/>
-                <a:gd name="connsiteY53" fmla="*/ 217429 h 645013"/>
-                <a:gd name="connsiteX54" fmla="*/ 663861 w 774567"/>
-                <a:gd name="connsiteY54" fmla="*/ 63793 h 645013"/>
-                <a:gd name="connsiteX55" fmla="*/ 625192 w 774567"/>
-                <a:gd name="connsiteY55" fmla="*/ 325623 h 645013"/>
-                <a:gd name="connsiteX56" fmla="*/ 187152 w 774567"/>
-                <a:gd name="connsiteY56" fmla="*/ 562444 h 645013"/>
-                <a:gd name="connsiteX57" fmla="*/ 163190 w 774567"/>
-                <a:gd name="connsiteY57" fmla="*/ 400297 h 645013"/>
-                <a:gd name="connsiteX58" fmla="*/ 244477 w 774567"/>
-                <a:gd name="connsiteY58" fmla="*/ 495489 h 645013"/>
-                <a:gd name="connsiteX59" fmla="*/ 187481 w 774567"/>
-                <a:gd name="connsiteY59" fmla="*/ 562547 h 645013"/>
-                <a:gd name="connsiteX60" fmla="*/ 187207 w 774567"/>
-                <a:gd name="connsiteY60" fmla="*/ 562552 h 645013"/>
-                <a:gd name="connsiteX61" fmla="*/ 187152 w 774567"/>
-                <a:gd name="connsiteY61" fmla="*/ 562444 h 645013"/>
-                <a:gd name="connsiteX62" fmla="*/ 389109 w 774567"/>
-                <a:gd name="connsiteY62" fmla="*/ 603224 h 645013"/>
-                <a:gd name="connsiteX63" fmla="*/ 297078 w 774567"/>
-                <a:gd name="connsiteY63" fmla="*/ 495425 h 645013"/>
-                <a:gd name="connsiteX64" fmla="*/ 388644 w 774567"/>
-                <a:gd name="connsiteY64" fmla="*/ 387690 h 645013"/>
-                <a:gd name="connsiteX65" fmla="*/ 480809 w 774567"/>
-                <a:gd name="connsiteY65" fmla="*/ 496133 h 645013"/>
-                <a:gd name="connsiteX66" fmla="*/ 389479 w 774567"/>
-                <a:gd name="connsiteY66" fmla="*/ 603224 h 645013"/>
-                <a:gd name="connsiteX67" fmla="*/ 389187 w 774567"/>
-                <a:gd name="connsiteY67" fmla="*/ 603306 h 645013"/>
-                <a:gd name="connsiteX68" fmla="*/ 389109 w 774567"/>
-                <a:gd name="connsiteY68" fmla="*/ 603224 h 645013"/>
-                <a:gd name="connsiteX69" fmla="*/ 589806 w 774567"/>
-                <a:gd name="connsiteY69" fmla="*/ 562547 h 645013"/>
-                <a:gd name="connsiteX70" fmla="*/ 533452 w 774567"/>
-                <a:gd name="connsiteY70" fmla="*/ 496195 h 645013"/>
-                <a:gd name="connsiteX71" fmla="*/ 613882 w 774567"/>
-                <a:gd name="connsiteY71" fmla="*/ 402004 h 645013"/>
-                <a:gd name="connsiteX72" fmla="*/ 590174 w 774567"/>
-                <a:gd name="connsiteY72" fmla="*/ 562444 h 645013"/>
-                <a:gd name="connsiteX73" fmla="*/ 589922 w 774567"/>
-                <a:gd name="connsiteY73" fmla="*/ 562621 h 645013"/>
-                <a:gd name="connsiteX74" fmla="*/ 589806 w 774567"/>
-                <a:gd name="connsiteY74" fmla="*/ 562547 h 645013"/>
+                <a:gd name="connsiteX0" fmla="*/ 494470 w 507194"/>
+                <a:gd name="connsiteY0" fmla="*/ 25449 h 394461"/>
+                <a:gd name="connsiteX1" fmla="*/ 507194 w 507194"/>
+                <a:gd name="connsiteY1" fmla="*/ 12724 h 394461"/>
+                <a:gd name="connsiteX2" fmla="*/ 494470 w 507194"/>
+                <a:gd name="connsiteY2" fmla="*/ 0 h 394461"/>
+                <a:gd name="connsiteX3" fmla="*/ 12724 w 507194"/>
+                <a:gd name="connsiteY3" fmla="*/ 0 h 394461"/>
+                <a:gd name="connsiteX4" fmla="*/ 0 w 507194"/>
+                <a:gd name="connsiteY4" fmla="*/ 12724 h 394461"/>
+                <a:gd name="connsiteX5" fmla="*/ 12724 w 507194"/>
+                <a:gd name="connsiteY5" fmla="*/ 25449 h 394461"/>
+                <a:gd name="connsiteX6" fmla="*/ 46380 w 507194"/>
+                <a:gd name="connsiteY6" fmla="*/ 25449 h 394461"/>
+                <a:gd name="connsiteX7" fmla="*/ 99517 w 507194"/>
+                <a:gd name="connsiteY7" fmla="*/ 361373 h 394461"/>
+                <a:gd name="connsiteX8" fmla="*/ 112916 w 507194"/>
+                <a:gd name="connsiteY8" fmla="*/ 376642 h 394461"/>
+                <a:gd name="connsiteX9" fmla="*/ 118451 w 507194"/>
+                <a:gd name="connsiteY9" fmla="*/ 377456 h 394461"/>
+                <a:gd name="connsiteX10" fmla="*/ 132448 w 507194"/>
+                <a:gd name="connsiteY10" fmla="*/ 371196 h 394461"/>
+                <a:gd name="connsiteX11" fmla="*/ 177327 w 507194"/>
+                <a:gd name="connsiteY11" fmla="*/ 321927 h 394461"/>
+                <a:gd name="connsiteX12" fmla="*/ 236165 w 507194"/>
+                <a:gd name="connsiteY12" fmla="*/ 386185 h 394461"/>
+                <a:gd name="connsiteX13" fmla="*/ 272119 w 507194"/>
+                <a:gd name="connsiteY13" fmla="*/ 387794 h 394461"/>
+                <a:gd name="connsiteX14" fmla="*/ 273727 w 507194"/>
+                <a:gd name="connsiteY14" fmla="*/ 386185 h 394461"/>
+                <a:gd name="connsiteX15" fmla="*/ 332107 w 507194"/>
+                <a:gd name="connsiteY15" fmla="*/ 322321 h 394461"/>
+                <a:gd name="connsiteX16" fmla="*/ 376553 w 507194"/>
+                <a:gd name="connsiteY16" fmla="*/ 371158 h 394461"/>
+                <a:gd name="connsiteX17" fmla="*/ 390550 w 507194"/>
+                <a:gd name="connsiteY17" fmla="*/ 377418 h 394461"/>
+                <a:gd name="connsiteX18" fmla="*/ 396097 w 507194"/>
+                <a:gd name="connsiteY18" fmla="*/ 376604 h 394461"/>
+                <a:gd name="connsiteX19" fmla="*/ 409471 w 507194"/>
+                <a:gd name="connsiteY19" fmla="*/ 361334 h 394461"/>
+                <a:gd name="connsiteX20" fmla="*/ 462659 w 507194"/>
+                <a:gd name="connsiteY20" fmla="*/ 25449 h 394461"/>
+                <a:gd name="connsiteX21" fmla="*/ 494470 w 507194"/>
+                <a:gd name="connsiteY21" fmla="*/ 25449 h 394461"/>
+                <a:gd name="connsiteX22" fmla="*/ 290256 w 507194"/>
+                <a:gd name="connsiteY22" fmla="*/ 25449 h 394461"/>
+                <a:gd name="connsiteX23" fmla="*/ 412665 w 507194"/>
+                <a:gd name="connsiteY23" fmla="*/ 25449 h 394461"/>
+                <a:gd name="connsiteX24" fmla="*/ 331967 w 507194"/>
+                <a:gd name="connsiteY24" fmla="*/ 114138 h 394461"/>
+                <a:gd name="connsiteX25" fmla="*/ 270699 w 507194"/>
+                <a:gd name="connsiteY25" fmla="*/ 46838 h 394461"/>
+                <a:gd name="connsiteX26" fmla="*/ 290256 w 507194"/>
+                <a:gd name="connsiteY26" fmla="*/ 25449 h 394461"/>
+                <a:gd name="connsiteX27" fmla="*/ 236254 w 507194"/>
+                <a:gd name="connsiteY27" fmla="*/ 46800 h 394461"/>
+                <a:gd name="connsiteX28" fmla="*/ 175864 w 507194"/>
+                <a:gd name="connsiteY28" fmla="*/ 112865 h 394461"/>
+                <a:gd name="connsiteX29" fmla="*/ 96324 w 507194"/>
+                <a:gd name="connsiteY29" fmla="*/ 25449 h 394461"/>
+                <a:gd name="connsiteX30" fmla="*/ 216811 w 507194"/>
+                <a:gd name="connsiteY30" fmla="*/ 25449 h 394461"/>
+                <a:gd name="connsiteX31" fmla="*/ 236254 w 507194"/>
+                <a:gd name="connsiteY31" fmla="*/ 46800 h 394461"/>
+                <a:gd name="connsiteX32" fmla="*/ 158635 w 507194"/>
+                <a:gd name="connsiteY32" fmla="*/ 131723 h 394461"/>
+                <a:gd name="connsiteX33" fmla="*/ 99276 w 507194"/>
+                <a:gd name="connsiteY33" fmla="*/ 196617 h 394461"/>
+                <a:gd name="connsiteX34" fmla="*/ 74310 w 507194"/>
+                <a:gd name="connsiteY34" fmla="*/ 39077 h 394461"/>
+                <a:gd name="connsiteX35" fmla="*/ 158635 w 507194"/>
+                <a:gd name="connsiteY35" fmla="*/ 131723 h 394461"/>
+                <a:gd name="connsiteX36" fmla="*/ 175838 w 507194"/>
+                <a:gd name="connsiteY36" fmla="*/ 150631 h 394461"/>
+                <a:gd name="connsiteX37" fmla="*/ 237310 w 507194"/>
+                <a:gd name="connsiteY37" fmla="*/ 218185 h 394461"/>
+                <a:gd name="connsiteX38" fmla="*/ 177314 w 507194"/>
+                <a:gd name="connsiteY38" fmla="*/ 284123 h 394461"/>
+                <a:gd name="connsiteX39" fmla="*/ 115537 w 507194"/>
+                <a:gd name="connsiteY39" fmla="*/ 216569 h 394461"/>
+                <a:gd name="connsiteX40" fmla="*/ 175838 w 507194"/>
+                <a:gd name="connsiteY40" fmla="*/ 150631 h 394461"/>
+                <a:gd name="connsiteX41" fmla="*/ 193093 w 507194"/>
+                <a:gd name="connsiteY41" fmla="*/ 131761 h 394461"/>
+                <a:gd name="connsiteX42" fmla="*/ 253483 w 507194"/>
+                <a:gd name="connsiteY42" fmla="*/ 65709 h 394461"/>
+                <a:gd name="connsiteX43" fmla="*/ 314789 w 507194"/>
+                <a:gd name="connsiteY43" fmla="*/ 133046 h 394461"/>
+                <a:gd name="connsiteX44" fmla="*/ 254526 w 507194"/>
+                <a:gd name="connsiteY44" fmla="*/ 199213 h 394461"/>
+                <a:gd name="connsiteX45" fmla="*/ 193093 w 507194"/>
+                <a:gd name="connsiteY45" fmla="*/ 131761 h 394461"/>
+                <a:gd name="connsiteX46" fmla="*/ 331992 w 507194"/>
+                <a:gd name="connsiteY46" fmla="*/ 151942 h 394461"/>
+                <a:gd name="connsiteX47" fmla="*/ 392547 w 507194"/>
+                <a:gd name="connsiteY47" fmla="*/ 218452 h 394461"/>
+                <a:gd name="connsiteX48" fmla="*/ 332119 w 507194"/>
+                <a:gd name="connsiteY48" fmla="*/ 284555 h 394461"/>
+                <a:gd name="connsiteX49" fmla="*/ 271729 w 507194"/>
+                <a:gd name="connsiteY49" fmla="*/ 218172 h 394461"/>
+                <a:gd name="connsiteX50" fmla="*/ 331992 w 507194"/>
+                <a:gd name="connsiteY50" fmla="*/ 151942 h 394461"/>
+                <a:gd name="connsiteX51" fmla="*/ 409382 w 507194"/>
+                <a:gd name="connsiteY51" fmla="*/ 199137 h 394461"/>
+                <a:gd name="connsiteX52" fmla="*/ 349195 w 507194"/>
+                <a:gd name="connsiteY52" fmla="*/ 132970 h 394461"/>
+                <a:gd name="connsiteX53" fmla="*/ 434703 w 507194"/>
+                <a:gd name="connsiteY53" fmla="*/ 39013 h 394461"/>
+                <a:gd name="connsiteX54" fmla="*/ 409382 w 507194"/>
+                <a:gd name="connsiteY54" fmla="*/ 199137 h 394461"/>
+                <a:gd name="connsiteX55" fmla="*/ 122549 w 507194"/>
+                <a:gd name="connsiteY55" fmla="*/ 343966 h 394461"/>
+                <a:gd name="connsiteX56" fmla="*/ 106859 w 507194"/>
+                <a:gd name="connsiteY56" fmla="*/ 244804 h 394461"/>
+                <a:gd name="connsiteX57" fmla="*/ 160086 w 507194"/>
+                <a:gd name="connsiteY57" fmla="*/ 303019 h 394461"/>
+                <a:gd name="connsiteX58" fmla="*/ 122765 w 507194"/>
+                <a:gd name="connsiteY58" fmla="*/ 344029 h 394461"/>
+                <a:gd name="connsiteX59" fmla="*/ 122585 w 507194"/>
+                <a:gd name="connsiteY59" fmla="*/ 344032 h 394461"/>
+                <a:gd name="connsiteX60" fmla="*/ 122549 w 507194"/>
+                <a:gd name="connsiteY60" fmla="*/ 343966 h 394461"/>
+                <a:gd name="connsiteX61" fmla="*/ 254793 w 507194"/>
+                <a:gd name="connsiteY61" fmla="*/ 368905 h 394461"/>
+                <a:gd name="connsiteX62" fmla="*/ 194530 w 507194"/>
+                <a:gd name="connsiteY62" fmla="*/ 302980 h 394461"/>
+                <a:gd name="connsiteX63" fmla="*/ 254488 w 507194"/>
+                <a:gd name="connsiteY63" fmla="*/ 237094 h 394461"/>
+                <a:gd name="connsiteX64" fmla="*/ 314839 w 507194"/>
+                <a:gd name="connsiteY64" fmla="*/ 303413 h 394461"/>
+                <a:gd name="connsiteX65" fmla="*/ 255035 w 507194"/>
+                <a:gd name="connsiteY65" fmla="*/ 368905 h 394461"/>
+                <a:gd name="connsiteX66" fmla="*/ 254844 w 507194"/>
+                <a:gd name="connsiteY66" fmla="*/ 368955 h 394461"/>
+                <a:gd name="connsiteX67" fmla="*/ 254793 w 507194"/>
+                <a:gd name="connsiteY67" fmla="*/ 368905 h 394461"/>
+                <a:gd name="connsiteX68" fmla="*/ 386211 w 507194"/>
+                <a:gd name="connsiteY68" fmla="*/ 344029 h 394461"/>
+                <a:gd name="connsiteX69" fmla="*/ 349310 w 507194"/>
+                <a:gd name="connsiteY69" fmla="*/ 303451 h 394461"/>
+                <a:gd name="connsiteX70" fmla="*/ 401976 w 507194"/>
+                <a:gd name="connsiteY70" fmla="*/ 245848 h 394461"/>
+                <a:gd name="connsiteX71" fmla="*/ 386452 w 507194"/>
+                <a:gd name="connsiteY71" fmla="*/ 343966 h 394461"/>
+                <a:gd name="connsiteX72" fmla="*/ 386287 w 507194"/>
+                <a:gd name="connsiteY72" fmla="*/ 344074 h 394461"/>
+                <a:gd name="connsiteX73" fmla="*/ 386211 w 507194"/>
+                <a:gd name="connsiteY73" fmla="*/ 344029 h 394461"/>
               </a:gdLst>
               <a:ahLst/>
               <a:cxnLst>
@@ -4886,741 +4832,728 @@
                 <a:cxn ang="0">
                   <a:pos x="connsiteX73" y="connsiteY73"/>
                 </a:cxn>
-                <a:cxn ang="0">
-                  <a:pos x="connsiteX74" y="connsiteY74"/>
-                </a:cxn>
               </a:cxnLst>
               <a:rect l="l" t="t" r="r" b="b"/>
               <a:pathLst>
-                <a:path w="774567" h="645013" fill="none" extrusionOk="0">
+                <a:path w="507194" h="394461" fill="none" extrusionOk="0">
                   <a:moveTo>
-                    <a:pt x="755135" y="41613"/>
+                    <a:pt x="494470" y="25449"/>
                   </a:moveTo>
                   <a:cubicBezTo>
-                    <a:pt x="766793" y="39431"/>
-                    <a:pt x="773541" y="31756"/>
-                    <a:pt x="774567" y="20805"/>
-                  </a:cubicBezTo>
-                  <a:cubicBezTo>
-                    <a:pt x="775457" y="8378"/>
-                    <a:pt x="765517" y="17"/>
-                    <a:pt x="755135" y="0"/>
-                  </a:cubicBezTo>
-                  <a:cubicBezTo>
-                    <a:pt x="601565" y="6951"/>
-                    <a:pt x="550937" y="14223"/>
-                    <a:pt x="372569" y="0"/>
-                  </a:cubicBezTo>
-                  <a:cubicBezTo>
-                    <a:pt x="194201" y="-14223"/>
-                    <a:pt x="166887" y="3654"/>
-                    <a:pt x="19431" y="0"/>
-                  </a:cubicBezTo>
-                  <a:cubicBezTo>
-                    <a:pt x="7096" y="957"/>
-                    <a:pt x="-1324" y="9729"/>
-                    <a:pt x="0" y="20805"/>
-                  </a:cubicBezTo>
-                  <a:cubicBezTo>
-                    <a:pt x="527" y="32729"/>
-                    <a:pt x="7344" y="41607"/>
-                    <a:pt x="19431" y="41613"/>
-                  </a:cubicBezTo>
-                  <a:cubicBezTo>
-                    <a:pt x="40880" y="43269"/>
-                    <a:pt x="60523" y="43458"/>
-                    <a:pt x="70829" y="41613"/>
-                  </a:cubicBezTo>
-                  <a:cubicBezTo>
-                    <a:pt x="105008" y="159458"/>
-                    <a:pt x="121464" y="412348"/>
-                    <a:pt x="151978" y="590908"/>
-                  </a:cubicBezTo>
-                  <a:cubicBezTo>
-                    <a:pt x="153732" y="601455"/>
-                    <a:pt x="161396" y="613600"/>
-                    <a:pt x="172440" y="615875"/>
-                  </a:cubicBezTo>
-                  <a:cubicBezTo>
-                    <a:pt x="175652" y="617164"/>
-                    <a:pt x="178428" y="617797"/>
-                    <a:pt x="180893" y="617206"/>
-                  </a:cubicBezTo>
-                  <a:cubicBezTo>
-                    <a:pt x="189522" y="617751"/>
-                    <a:pt x="197438" y="614684"/>
-                    <a:pt x="202269" y="606970"/>
-                  </a:cubicBezTo>
-                  <a:cubicBezTo>
-                    <a:pt x="223468" y="583992"/>
-                    <a:pt x="244685" y="552165"/>
-                    <a:pt x="270806" y="526407"/>
-                  </a:cubicBezTo>
-                  <a:cubicBezTo>
-                    <a:pt x="318407" y="574230"/>
-                    <a:pt x="335951" y="593317"/>
-                    <a:pt x="360662" y="631480"/>
-                  </a:cubicBezTo>
-                  <a:cubicBezTo>
-                    <a:pt x="380500" y="649710"/>
-                    <a:pt x="398477" y="653817"/>
-                    <a:pt x="415569" y="634111"/>
-                  </a:cubicBezTo>
-                  <a:cubicBezTo>
-                    <a:pt x="416323" y="633532"/>
-                    <a:pt x="417188" y="632282"/>
-                    <a:pt x="418025" y="631480"/>
-                  </a:cubicBezTo>
-                  <a:cubicBezTo>
-                    <a:pt x="446579" y="598708"/>
-                    <a:pt x="473641" y="556375"/>
-                    <a:pt x="507180" y="527051"/>
-                  </a:cubicBezTo>
-                  <a:cubicBezTo>
-                    <a:pt x="530146" y="560647"/>
-                    <a:pt x="563187" y="589485"/>
-                    <a:pt x="575057" y="606908"/>
-                  </a:cubicBezTo>
-                  <a:cubicBezTo>
-                    <a:pt x="581357" y="612193"/>
-                    <a:pt x="588581" y="617291"/>
-                    <a:pt x="596432" y="617144"/>
-                  </a:cubicBezTo>
-                  <a:cubicBezTo>
-                    <a:pt x="599475" y="617194"/>
-                    <a:pt x="602392" y="616526"/>
-                    <a:pt x="604903" y="615813"/>
-                  </a:cubicBezTo>
-                  <a:cubicBezTo>
-                    <a:pt x="616853" y="611268"/>
-                    <a:pt x="622718" y="602899"/>
-                    <a:pt x="625328" y="590844"/>
-                  </a:cubicBezTo>
-                  <a:cubicBezTo>
-                    <a:pt x="669283" y="446721"/>
-                    <a:pt x="698332" y="204849"/>
-                    <a:pt x="706554" y="41613"/>
-                  </a:cubicBezTo>
-                  <a:cubicBezTo>
-                    <a:pt x="727210" y="43252"/>
-                    <a:pt x="738804" y="42932"/>
-                    <a:pt x="755135" y="41613"/>
+                    <a:pt x="501687" y="26820"/>
+                    <a:pt x="506905" y="20013"/>
+                    <a:pt x="507194" y="12724"/>
+                  </a:cubicBezTo>
+                  <a:cubicBezTo>
+                    <a:pt x="507079" y="5538"/>
+                    <a:pt x="502511" y="-1007"/>
+                    <a:pt x="494470" y="0"/>
+                  </a:cubicBezTo>
+                  <a:cubicBezTo>
+                    <a:pt x="266875" y="416"/>
+                    <a:pt x="116378" y="3639"/>
+                    <a:pt x="12724" y="0"/>
+                  </a:cubicBezTo>
+                  <a:cubicBezTo>
+                    <a:pt x="5614" y="1073"/>
+                    <a:pt x="-1094" y="5579"/>
+                    <a:pt x="0" y="12724"/>
+                  </a:cubicBezTo>
+                  <a:cubicBezTo>
+                    <a:pt x="1448" y="20495"/>
+                    <a:pt x="5333" y="25666"/>
+                    <a:pt x="12724" y="25449"/>
+                  </a:cubicBezTo>
+                  <a:cubicBezTo>
+                    <a:pt x="26512" y="25164"/>
+                    <a:pt x="37256" y="25825"/>
+                    <a:pt x="46380" y="25449"/>
+                  </a:cubicBezTo>
+                  <a:cubicBezTo>
+                    <a:pt x="82017" y="144760"/>
+                    <a:pt x="87335" y="275470"/>
+                    <a:pt x="99517" y="361373"/>
+                  </a:cubicBezTo>
+                  <a:cubicBezTo>
+                    <a:pt x="100762" y="369035"/>
+                    <a:pt x="104174" y="374421"/>
+                    <a:pt x="112916" y="376642"/>
+                  </a:cubicBezTo>
+                  <a:cubicBezTo>
+                    <a:pt x="114885" y="377078"/>
+                    <a:pt x="116580" y="377231"/>
+                    <a:pt x="118451" y="377456"/>
+                  </a:cubicBezTo>
+                  <a:cubicBezTo>
+                    <a:pt x="123676" y="377873"/>
+                    <a:pt x="129330" y="375559"/>
+                    <a:pt x="132448" y="371196"/>
+                  </a:cubicBezTo>
+                  <a:cubicBezTo>
+                    <a:pt x="152714" y="351482"/>
+                    <a:pt x="165870" y="337057"/>
+                    <a:pt x="177327" y="321927"/>
+                  </a:cubicBezTo>
+                  <a:cubicBezTo>
+                    <a:pt x="191806" y="342138"/>
+                    <a:pt x="222487" y="371717"/>
+                    <a:pt x="236165" y="386185"/>
+                  </a:cubicBezTo>
+                  <a:cubicBezTo>
+                    <a:pt x="245554" y="396920"/>
+                    <a:pt x="262039" y="399637"/>
+                    <a:pt x="272119" y="387794"/>
+                  </a:cubicBezTo>
+                  <a:cubicBezTo>
+                    <a:pt x="272632" y="387353"/>
+                    <a:pt x="273399" y="386789"/>
+                    <a:pt x="273727" y="386185"/>
+                  </a:cubicBezTo>
+                  <a:cubicBezTo>
+                    <a:pt x="290940" y="369389"/>
+                    <a:pt x="305224" y="355719"/>
+                    <a:pt x="332107" y="322321"/>
+                  </a:cubicBezTo>
+                  <a:cubicBezTo>
+                    <a:pt x="351618" y="342194"/>
+                    <a:pt x="362614" y="356884"/>
+                    <a:pt x="376553" y="371158"/>
+                  </a:cubicBezTo>
+                  <a:cubicBezTo>
+                    <a:pt x="379151" y="375081"/>
+                    <a:pt x="385705" y="378102"/>
+                    <a:pt x="390550" y="377418"/>
+                  </a:cubicBezTo>
+                  <a:cubicBezTo>
+                    <a:pt x="392595" y="377469"/>
+                    <a:pt x="394495" y="376860"/>
+                    <a:pt x="396097" y="376604"/>
+                  </a:cubicBezTo>
+                  <a:cubicBezTo>
+                    <a:pt x="404560" y="375392"/>
+                    <a:pt x="408806" y="368731"/>
+                    <a:pt x="409471" y="361334"/>
+                  </a:cubicBezTo>
+                  <a:cubicBezTo>
+                    <a:pt x="428235" y="214176"/>
+                    <a:pt x="446467" y="106610"/>
+                    <a:pt x="462659" y="25449"/>
+                  </a:cubicBezTo>
+                  <a:cubicBezTo>
+                    <a:pt x="476280" y="24286"/>
+                    <a:pt x="478683" y="24199"/>
+                    <a:pt x="494470" y="25449"/>
                   </a:cubicBezTo>
                   <a:close/>
                   <a:moveTo>
-                    <a:pt x="443267" y="41613"/>
+                    <a:pt x="290256" y="25449"/>
                   </a:moveTo>
                   <a:cubicBezTo>
-                    <a:pt x="489427" y="34483"/>
-                    <a:pt x="548984" y="47356"/>
-                    <a:pt x="630205" y="41613"/>
-                  </a:cubicBezTo>
-                  <a:cubicBezTo>
-                    <a:pt x="589598" y="99910"/>
-                    <a:pt x="539948" y="136795"/>
-                    <a:pt x="506967" y="186635"/>
-                  </a:cubicBezTo>
-                  <a:cubicBezTo>
-                    <a:pt x="468788" y="144135"/>
-                    <a:pt x="459775" y="131756"/>
-                    <a:pt x="413401" y="76588"/>
-                  </a:cubicBezTo>
-                  <a:cubicBezTo>
-                    <a:pt x="421424" y="67446"/>
-                    <a:pt x="429874" y="58251"/>
-                    <a:pt x="443267" y="41613"/>
+                    <a:pt x="332597" y="22519"/>
+                    <a:pt x="365394" y="20341"/>
+                    <a:pt x="412665" y="25449"/>
+                  </a:cubicBezTo>
+                  <a:cubicBezTo>
+                    <a:pt x="384354" y="55060"/>
+                    <a:pt x="351764" y="92250"/>
+                    <a:pt x="331967" y="114138"/>
+                  </a:cubicBezTo>
+                  <a:cubicBezTo>
+                    <a:pt x="310214" y="84891"/>
+                    <a:pt x="288532" y="70368"/>
+                    <a:pt x="270699" y="46838"/>
+                  </a:cubicBezTo>
+                  <a:cubicBezTo>
+                    <a:pt x="274245" y="40936"/>
+                    <a:pt x="284452" y="33176"/>
+                    <a:pt x="290256" y="25449"/>
                   </a:cubicBezTo>
                   <a:close/>
                   <a:moveTo>
-                    <a:pt x="360797" y="76526"/>
+                    <a:pt x="236254" y="46800"/>
                   </a:moveTo>
                   <a:cubicBezTo>
-                    <a:pt x="329334" y="106689"/>
-                    <a:pt x="297325" y="149079"/>
-                    <a:pt x="268572" y="184554"/>
-                  </a:cubicBezTo>
-                  <a:cubicBezTo>
-                    <a:pt x="224525" y="144033"/>
-                    <a:pt x="186350" y="99953"/>
-                    <a:pt x="147102" y="41613"/>
-                  </a:cubicBezTo>
-                  <a:cubicBezTo>
-                    <a:pt x="202520" y="36430"/>
-                    <a:pt x="264672" y="41689"/>
-                    <a:pt x="331105" y="41613"/>
-                  </a:cubicBezTo>
-                  <a:cubicBezTo>
-                    <a:pt x="346172" y="57668"/>
-                    <a:pt x="349431" y="65452"/>
-                    <a:pt x="360797" y="76526"/>
+                    <a:pt x="223491" y="63568"/>
+                    <a:pt x="203717" y="80070"/>
+                    <a:pt x="175864" y="112865"/>
+                  </a:cubicBezTo>
+                  <a:cubicBezTo>
+                    <a:pt x="143884" y="81046"/>
+                    <a:pt x="128490" y="53779"/>
+                    <a:pt x="96324" y="25449"/>
+                  </a:cubicBezTo>
+                  <a:cubicBezTo>
+                    <a:pt x="138319" y="27953"/>
+                    <a:pt x="178152" y="30806"/>
+                    <a:pt x="216811" y="25449"/>
+                  </a:cubicBezTo>
+                  <a:cubicBezTo>
+                    <a:pt x="225223" y="32702"/>
+                    <a:pt x="229931" y="38532"/>
+                    <a:pt x="236254" y="46800"/>
                   </a:cubicBezTo>
                   <a:close/>
                   <a:moveTo>
-                    <a:pt x="242261" y="215390"/>
+                    <a:pt x="158635" y="131723"/>
                   </a:moveTo>
                   <a:cubicBezTo>
-                    <a:pt x="207050" y="263435"/>
-                    <a:pt x="200436" y="272090"/>
-                    <a:pt x="151610" y="321503"/>
-                  </a:cubicBezTo>
-                  <a:cubicBezTo>
-                    <a:pt x="137734" y="249508"/>
-                    <a:pt x="127028" y="137013"/>
-                    <a:pt x="113483" y="63897"/>
-                  </a:cubicBezTo>
-                  <a:cubicBezTo>
-                    <a:pt x="157440" y="118836"/>
-                    <a:pt x="211077" y="171134"/>
-                    <a:pt x="242261" y="215390"/>
+                    <a:pt x="131034" y="160197"/>
+                    <a:pt x="124600" y="162786"/>
+                    <a:pt x="99276" y="196617"/>
+                  </a:cubicBezTo>
+                  <a:cubicBezTo>
+                    <a:pt x="85092" y="141421"/>
+                    <a:pt x="81438" y="77076"/>
+                    <a:pt x="74310" y="39077"/>
+                  </a:cubicBezTo>
+                  <a:cubicBezTo>
+                    <a:pt x="106073" y="78880"/>
+                    <a:pt x="130519" y="95349"/>
+                    <a:pt x="158635" y="131723"/>
                   </a:cubicBezTo>
                   <a:close/>
                   <a:moveTo>
-                    <a:pt x="268532" y="246308"/>
+                    <a:pt x="175838" y="150631"/>
                   </a:moveTo>
                   <a:cubicBezTo>
-                    <a:pt x="294898" y="270099"/>
-                    <a:pt x="340914" y="327224"/>
-                    <a:pt x="362410" y="356770"/>
-                  </a:cubicBezTo>
-                  <a:cubicBezTo>
-                    <a:pt x="332941" y="396027"/>
-                    <a:pt x="316525" y="420725"/>
-                    <a:pt x="270787" y="464590"/>
-                  </a:cubicBezTo>
-                  <a:cubicBezTo>
-                    <a:pt x="240381" y="422331"/>
-                    <a:pt x="206481" y="392446"/>
-                    <a:pt x="176443" y="354128"/>
-                  </a:cubicBezTo>
-                  <a:cubicBezTo>
-                    <a:pt x="204849" y="324114"/>
-                    <a:pt x="236098" y="280449"/>
-                    <a:pt x="268532" y="246308"/>
+                    <a:pt x="200201" y="177285"/>
+                    <a:pt x="215585" y="197695"/>
+                    <a:pt x="237310" y="218185"/>
+                  </a:cubicBezTo>
+                  <a:cubicBezTo>
+                    <a:pt x="223555" y="235501"/>
+                    <a:pt x="193813" y="261079"/>
+                    <a:pt x="177314" y="284123"/>
+                  </a:cubicBezTo>
+                  <a:cubicBezTo>
+                    <a:pt x="149702" y="248665"/>
+                    <a:pt x="141475" y="244647"/>
+                    <a:pt x="115537" y="216569"/>
+                  </a:cubicBezTo>
+                  <a:cubicBezTo>
+                    <a:pt x="144249" y="189593"/>
+                    <a:pt x="154324" y="172111"/>
+                    <a:pt x="175838" y="150631"/>
                   </a:cubicBezTo>
                   <a:close/>
                   <a:moveTo>
-                    <a:pt x="294884" y="215452"/>
+                    <a:pt x="193093" y="131761"/>
                   </a:moveTo>
                   <a:cubicBezTo>
-                    <a:pt x="320765" y="181389"/>
-                    <a:pt x="345693" y="148513"/>
-                    <a:pt x="387109" y="107445"/>
-                  </a:cubicBezTo>
-                  <a:cubicBezTo>
-                    <a:pt x="431126" y="162694"/>
-                    <a:pt x="459143" y="196360"/>
-                    <a:pt x="480733" y="217553"/>
-                  </a:cubicBezTo>
-                  <a:cubicBezTo>
-                    <a:pt x="455928" y="242789"/>
-                    <a:pt x="409439" y="303245"/>
-                    <a:pt x="388702" y="325748"/>
-                  </a:cubicBezTo>
-                  <a:cubicBezTo>
-                    <a:pt x="357632" y="282154"/>
-                    <a:pt x="331532" y="258253"/>
-                    <a:pt x="294884" y="215452"/>
+                    <a:pt x="217853" y="101955"/>
+                    <a:pt x="230579" y="94257"/>
+                    <a:pt x="253483" y="65709"/>
+                  </a:cubicBezTo>
+                  <a:cubicBezTo>
+                    <a:pt x="275338" y="90033"/>
+                    <a:pt x="299037" y="114949"/>
+                    <a:pt x="314789" y="133046"/>
+                  </a:cubicBezTo>
+                  <a:cubicBezTo>
+                    <a:pt x="304251" y="149702"/>
+                    <a:pt x="274408" y="178629"/>
+                    <a:pt x="254526" y="199213"/>
+                  </a:cubicBezTo>
+                  <a:cubicBezTo>
+                    <a:pt x="225447" y="172655"/>
+                    <a:pt x="212200" y="156766"/>
+                    <a:pt x="193093" y="131761"/>
                   </a:cubicBezTo>
                   <a:close/>
                   <a:moveTo>
-                    <a:pt x="507005" y="248451"/>
+                    <a:pt x="331992" y="151942"/>
                   </a:moveTo>
                   <a:cubicBezTo>
-                    <a:pt x="528357" y="269141"/>
-                    <a:pt x="554285" y="311458"/>
-                    <a:pt x="599482" y="357207"/>
-                  </a:cubicBezTo>
-                  <a:cubicBezTo>
-                    <a:pt x="567336" y="384294"/>
-                    <a:pt x="553832" y="414466"/>
-                    <a:pt x="507199" y="465297"/>
-                  </a:cubicBezTo>
-                  <a:cubicBezTo>
-                    <a:pt x="485380" y="437658"/>
-                    <a:pt x="456437" y="413214"/>
-                    <a:pt x="414973" y="356749"/>
-                  </a:cubicBezTo>
-                  <a:cubicBezTo>
-                    <a:pt x="456726" y="308321"/>
-                    <a:pt x="471486" y="288906"/>
-                    <a:pt x="507005" y="248451"/>
+                    <a:pt x="345930" y="173544"/>
+                    <a:pt x="371889" y="190619"/>
+                    <a:pt x="392547" y="218452"/>
+                  </a:cubicBezTo>
+                  <a:cubicBezTo>
+                    <a:pt x="379300" y="234652"/>
+                    <a:pt x="343984" y="265326"/>
+                    <a:pt x="332119" y="284555"/>
+                  </a:cubicBezTo>
+                  <a:cubicBezTo>
+                    <a:pt x="319800" y="266025"/>
+                    <a:pt x="294879" y="238805"/>
+                    <a:pt x="271729" y="218172"/>
+                  </a:cubicBezTo>
+                  <a:cubicBezTo>
+                    <a:pt x="297481" y="186319"/>
+                    <a:pt x="314229" y="172121"/>
+                    <a:pt x="331992" y="151942"/>
                   </a:cubicBezTo>
                   <a:close/>
                   <a:moveTo>
-                    <a:pt x="625192" y="325623"/>
+                    <a:pt x="409382" y="199137"/>
                   </a:moveTo>
                   <a:cubicBezTo>
-                    <a:pt x="592650" y="291956"/>
-                    <a:pt x="578022" y="265614"/>
-                    <a:pt x="533277" y="217429"/>
-                  </a:cubicBezTo>
-                  <a:cubicBezTo>
-                    <a:pt x="589519" y="143456"/>
-                    <a:pt x="630182" y="107209"/>
-                    <a:pt x="663861" y="63793"/>
-                  </a:cubicBezTo>
-                  <a:cubicBezTo>
-                    <a:pt x="645162" y="157274"/>
-                    <a:pt x="626663" y="236344"/>
-                    <a:pt x="625192" y="325623"/>
+                    <a:pt x="391394" y="181342"/>
+                    <a:pt x="375087" y="158705"/>
+                    <a:pt x="349195" y="132970"/>
+                  </a:cubicBezTo>
+                  <a:cubicBezTo>
+                    <a:pt x="385934" y="99657"/>
+                    <a:pt x="416938" y="57831"/>
+                    <a:pt x="434703" y="39013"/>
+                  </a:cubicBezTo>
+                  <a:cubicBezTo>
+                    <a:pt x="422130" y="73487"/>
+                    <a:pt x="424214" y="130647"/>
+                    <a:pt x="409382" y="199137"/>
                   </a:cubicBezTo>
                   <a:close/>
                   <a:moveTo>
-                    <a:pt x="187152" y="562444"/>
+                    <a:pt x="122549" y="343966"/>
                   </a:moveTo>
                   <a:cubicBezTo>
-                    <a:pt x="185115" y="504524"/>
-                    <a:pt x="175657" y="444026"/>
-                    <a:pt x="163190" y="400297"/>
-                  </a:cubicBezTo>
-                  <a:cubicBezTo>
-                    <a:pt x="184650" y="424231"/>
-                    <a:pt x="211341" y="460533"/>
-                    <a:pt x="244477" y="495489"/>
-                  </a:cubicBezTo>
-                  <a:cubicBezTo>
-                    <a:pt x="216655" y="524059"/>
-                    <a:pt x="210507" y="541986"/>
-                    <a:pt x="187481" y="562547"/>
-                  </a:cubicBezTo>
-                  <a:cubicBezTo>
-                    <a:pt x="187391" y="562638"/>
-                    <a:pt x="187271" y="562645"/>
-                    <a:pt x="187207" y="562552"/>
-                  </a:cubicBezTo>
-                  <a:cubicBezTo>
-                    <a:pt x="187173" y="562522"/>
-                    <a:pt x="187149" y="562481"/>
-                    <a:pt x="187152" y="562444"/>
+                    <a:pt x="120382" y="302981"/>
+                    <a:pt x="109889" y="276798"/>
+                    <a:pt x="106859" y="244804"/>
+                  </a:cubicBezTo>
+                  <a:cubicBezTo>
+                    <a:pt x="116808" y="260609"/>
+                    <a:pt x="137074" y="274837"/>
+                    <a:pt x="160086" y="303019"/>
+                  </a:cubicBezTo>
+                  <a:cubicBezTo>
+                    <a:pt x="146445" y="317208"/>
+                    <a:pt x="134433" y="335169"/>
+                    <a:pt x="122765" y="344029"/>
+                  </a:cubicBezTo>
+                  <a:cubicBezTo>
+                    <a:pt x="122717" y="344074"/>
+                    <a:pt x="122634" y="344093"/>
+                    <a:pt x="122585" y="344032"/>
+                  </a:cubicBezTo>
+                  <a:cubicBezTo>
+                    <a:pt x="122566" y="344013"/>
+                    <a:pt x="122550" y="343992"/>
+                    <a:pt x="122549" y="343966"/>
                   </a:cubicBezTo>
                   <a:close/>
                   <a:moveTo>
-                    <a:pt x="389109" y="603224"/>
+                    <a:pt x="254793" y="368905"/>
                   </a:moveTo>
                   <a:cubicBezTo>
-                    <a:pt x="351719" y="567800"/>
-                    <a:pt x="331911" y="529571"/>
-                    <a:pt x="297078" y="495425"/>
-                  </a:cubicBezTo>
-                  <a:cubicBezTo>
-                    <a:pt x="339432" y="441754"/>
-                    <a:pt x="350927" y="426626"/>
-                    <a:pt x="388644" y="387690"/>
-                  </a:cubicBezTo>
-                  <a:cubicBezTo>
-                    <a:pt x="422707" y="429949"/>
-                    <a:pt x="445145" y="443751"/>
-                    <a:pt x="480809" y="496133"/>
-                  </a:cubicBezTo>
-                  <a:cubicBezTo>
-                    <a:pt x="445796" y="543222"/>
-                    <a:pt x="433428" y="560366"/>
-                    <a:pt x="389479" y="603224"/>
-                  </a:cubicBezTo>
-                  <a:cubicBezTo>
-                    <a:pt x="389417" y="603342"/>
-                    <a:pt x="389317" y="603368"/>
-                    <a:pt x="389187" y="603306"/>
-                  </a:cubicBezTo>
-                  <a:cubicBezTo>
-                    <a:pt x="389152" y="603278"/>
-                    <a:pt x="389134" y="603252"/>
-                    <a:pt x="389109" y="603224"/>
+                    <a:pt x="234778" y="348861"/>
+                    <a:pt x="216514" y="325963"/>
+                    <a:pt x="194530" y="302980"/>
+                  </a:cubicBezTo>
+                  <a:cubicBezTo>
+                    <a:pt x="207758" y="285721"/>
+                    <a:pt x="242992" y="251560"/>
+                    <a:pt x="254488" y="237094"/>
+                  </a:cubicBezTo>
+                  <a:cubicBezTo>
+                    <a:pt x="270920" y="257567"/>
+                    <a:pt x="284431" y="273515"/>
+                    <a:pt x="314839" y="303413"/>
+                  </a:cubicBezTo>
+                  <a:cubicBezTo>
+                    <a:pt x="298030" y="325371"/>
+                    <a:pt x="275109" y="341348"/>
+                    <a:pt x="255035" y="368905"/>
+                  </a:cubicBezTo>
+                  <a:cubicBezTo>
+                    <a:pt x="254985" y="368977"/>
+                    <a:pt x="254912" y="368981"/>
+                    <a:pt x="254844" y="368955"/>
+                  </a:cubicBezTo>
+                  <a:cubicBezTo>
+                    <a:pt x="254822" y="368942"/>
+                    <a:pt x="254805" y="368932"/>
+                    <a:pt x="254793" y="368905"/>
                   </a:cubicBezTo>
                   <a:close/>
                   <a:moveTo>
-                    <a:pt x="589806" y="562547"/>
+                    <a:pt x="386211" y="344029"/>
                   </a:moveTo>
                   <a:cubicBezTo>
-                    <a:pt x="570820" y="544400"/>
-                    <a:pt x="544047" y="511882"/>
-                    <a:pt x="533452" y="496195"/>
-                  </a:cubicBezTo>
-                  <a:cubicBezTo>
-                    <a:pt x="573916" y="452136"/>
-                    <a:pt x="577141" y="441448"/>
-                    <a:pt x="613882" y="402004"/>
-                  </a:cubicBezTo>
-                  <a:cubicBezTo>
-                    <a:pt x="605939" y="480477"/>
-                    <a:pt x="589087" y="526939"/>
-                    <a:pt x="590174" y="562444"/>
-                  </a:cubicBezTo>
-                  <a:cubicBezTo>
-                    <a:pt x="590175" y="562563"/>
-                    <a:pt x="590045" y="562649"/>
-                    <a:pt x="589922" y="562621"/>
-                  </a:cubicBezTo>
-                  <a:cubicBezTo>
-                    <a:pt x="589879" y="562618"/>
-                    <a:pt x="589831" y="562585"/>
-                    <a:pt x="589806" y="562547"/>
+                    <a:pt x="372230" y="328275"/>
+                    <a:pt x="358230" y="312054"/>
+                    <a:pt x="349310" y="303451"/>
+                  </a:cubicBezTo>
+                  <a:cubicBezTo>
+                    <a:pt x="367597" y="285167"/>
+                    <a:pt x="388234" y="258425"/>
+                    <a:pt x="401976" y="245848"/>
+                  </a:cubicBezTo>
+                  <a:cubicBezTo>
+                    <a:pt x="391624" y="289605"/>
+                    <a:pt x="394699" y="313521"/>
+                    <a:pt x="386452" y="343966"/>
+                  </a:cubicBezTo>
+                  <a:cubicBezTo>
+                    <a:pt x="386445" y="344056"/>
+                    <a:pt x="386363" y="344099"/>
+                    <a:pt x="386287" y="344074"/>
+                  </a:cubicBezTo>
+                  <a:cubicBezTo>
+                    <a:pt x="386256" y="344068"/>
+                    <a:pt x="386237" y="344051"/>
+                    <a:pt x="386211" y="344029"/>
                   </a:cubicBezTo>
                   <a:close/>
                 </a:path>
-                <a:path w="774567" h="645013" stroke="0" extrusionOk="0">
+                <a:path w="507194" h="394461" stroke="0" extrusionOk="0">
                   <a:moveTo>
-                    <a:pt x="755135" y="41613"/>
+                    <a:pt x="494470" y="25449"/>
                   </a:moveTo>
                   <a:cubicBezTo>
-                    <a:pt x="767459" y="40917"/>
-                    <a:pt x="775258" y="34362"/>
-                    <a:pt x="774567" y="20805"/>
-                  </a:cubicBezTo>
-                  <a:cubicBezTo>
-                    <a:pt x="773567" y="10988"/>
-                    <a:pt x="764436" y="885"/>
-                    <a:pt x="755135" y="0"/>
-                  </a:cubicBezTo>
-                  <a:cubicBezTo>
-                    <a:pt x="598358" y="-7764"/>
-                    <a:pt x="550032" y="-12679"/>
-                    <a:pt x="409354" y="0"/>
-                  </a:cubicBezTo>
-                  <a:cubicBezTo>
-                    <a:pt x="268676" y="12679"/>
-                    <a:pt x="206465" y="17619"/>
-                    <a:pt x="19431" y="0"/>
-                  </a:cubicBezTo>
-                  <a:cubicBezTo>
-                    <a:pt x="9996" y="-1210"/>
-                    <a:pt x="1813" y="7138"/>
-                    <a:pt x="0" y="20805"/>
-                  </a:cubicBezTo>
-                  <a:cubicBezTo>
-                    <a:pt x="701" y="34120"/>
-                    <a:pt x="9590" y="40292"/>
-                    <a:pt x="19431" y="41613"/>
-                  </a:cubicBezTo>
-                  <a:cubicBezTo>
-                    <a:pt x="31150" y="41935"/>
-                    <a:pt x="55309" y="40279"/>
-                    <a:pt x="70829" y="41613"/>
-                  </a:cubicBezTo>
-                  <a:cubicBezTo>
-                    <a:pt x="87252" y="187174"/>
-                    <a:pt x="97680" y="352110"/>
-                    <a:pt x="151978" y="590908"/>
-                  </a:cubicBezTo>
-                  <a:cubicBezTo>
-                    <a:pt x="154275" y="602238"/>
-                    <a:pt x="162103" y="614481"/>
-                    <a:pt x="172440" y="615875"/>
-                  </a:cubicBezTo>
-                  <a:cubicBezTo>
-                    <a:pt x="175005" y="616583"/>
-                    <a:pt x="177985" y="617619"/>
-                    <a:pt x="180893" y="617206"/>
-                  </a:cubicBezTo>
-                  <a:cubicBezTo>
-                    <a:pt x="189628" y="616938"/>
-                    <a:pt x="195399" y="612592"/>
-                    <a:pt x="202269" y="606970"/>
-                  </a:cubicBezTo>
-                  <a:cubicBezTo>
-                    <a:pt x="224897" y="580147"/>
-                    <a:pt x="253730" y="553554"/>
-                    <a:pt x="270806" y="526407"/>
-                  </a:cubicBezTo>
-                  <a:cubicBezTo>
-                    <a:pt x="299842" y="550235"/>
-                    <a:pt x="320601" y="577884"/>
-                    <a:pt x="360662" y="631480"/>
-                  </a:cubicBezTo>
-                  <a:cubicBezTo>
-                    <a:pt x="370254" y="649973"/>
-                    <a:pt x="400560" y="649674"/>
-                    <a:pt x="415569" y="634111"/>
-                  </a:cubicBezTo>
-                  <a:cubicBezTo>
-                    <a:pt x="416595" y="633109"/>
-                    <a:pt x="417249" y="632243"/>
-                    <a:pt x="418025" y="631480"/>
-                  </a:cubicBezTo>
-                  <a:cubicBezTo>
-                    <a:pt x="450668" y="593361"/>
-                    <a:pt x="488376" y="550242"/>
-                    <a:pt x="507180" y="527051"/>
-                  </a:cubicBezTo>
-                  <a:cubicBezTo>
-                    <a:pt x="530652" y="557844"/>
-                    <a:pt x="547947" y="574529"/>
-                    <a:pt x="575057" y="606908"/>
-                  </a:cubicBezTo>
-                  <a:cubicBezTo>
-                    <a:pt x="581848" y="613261"/>
-                    <a:pt x="586641" y="617622"/>
-                    <a:pt x="596432" y="617144"/>
-                  </a:cubicBezTo>
-                  <a:cubicBezTo>
-                    <a:pt x="599538" y="616732"/>
-                    <a:pt x="602176" y="616173"/>
-                    <a:pt x="604903" y="615813"/>
-                  </a:cubicBezTo>
-                  <a:cubicBezTo>
-                    <a:pt x="615806" y="609975"/>
-                    <a:pt x="624182" y="602561"/>
-                    <a:pt x="625328" y="590844"/>
-                  </a:cubicBezTo>
-                  <a:cubicBezTo>
-                    <a:pt x="641053" y="439790"/>
-                    <a:pt x="689777" y="313093"/>
-                    <a:pt x="706554" y="41613"/>
-                  </a:cubicBezTo>
-                  <a:cubicBezTo>
-                    <a:pt x="729254" y="39237"/>
-                    <a:pt x="731684" y="41931"/>
-                    <a:pt x="755135" y="41613"/>
+                    <a:pt x="502027" y="25217"/>
+                    <a:pt x="507387" y="20329"/>
+                    <a:pt x="507194" y="12724"/>
+                  </a:cubicBezTo>
+                  <a:cubicBezTo>
+                    <a:pt x="506557" y="6761"/>
+                    <a:pt x="500167" y="823"/>
+                    <a:pt x="494470" y="0"/>
+                  </a:cubicBezTo>
+                  <a:cubicBezTo>
+                    <a:pt x="305269" y="14443"/>
+                    <a:pt x="221413" y="-20214"/>
+                    <a:pt x="12724" y="0"/>
+                  </a:cubicBezTo>
+                  <a:cubicBezTo>
+                    <a:pt x="5747" y="294"/>
+                    <a:pt x="-112" y="7363"/>
+                    <a:pt x="0" y="12724"/>
+                  </a:cubicBezTo>
+                  <a:cubicBezTo>
+                    <a:pt x="-8" y="20493"/>
+                    <a:pt x="5043" y="24308"/>
+                    <a:pt x="12724" y="25449"/>
+                  </a:cubicBezTo>
+                  <a:cubicBezTo>
+                    <a:pt x="22137" y="25744"/>
+                    <a:pt x="36342" y="27059"/>
+                    <a:pt x="46380" y="25449"/>
+                  </a:cubicBezTo>
+                  <a:cubicBezTo>
+                    <a:pt x="81512" y="185095"/>
+                    <a:pt x="86970" y="210483"/>
+                    <a:pt x="99517" y="361373"/>
+                  </a:cubicBezTo>
+                  <a:cubicBezTo>
+                    <a:pt x="101572" y="370016"/>
+                    <a:pt x="105814" y="374349"/>
+                    <a:pt x="112916" y="376642"/>
+                  </a:cubicBezTo>
+                  <a:cubicBezTo>
+                    <a:pt x="114836" y="376955"/>
+                    <a:pt x="116769" y="377793"/>
+                    <a:pt x="118451" y="377456"/>
+                  </a:cubicBezTo>
+                  <a:cubicBezTo>
+                    <a:pt x="124103" y="376888"/>
+                    <a:pt x="128999" y="375217"/>
+                    <a:pt x="132448" y="371196"/>
+                  </a:cubicBezTo>
+                  <a:cubicBezTo>
+                    <a:pt x="152150" y="351184"/>
+                    <a:pt x="161467" y="340537"/>
+                    <a:pt x="177327" y="321927"/>
+                  </a:cubicBezTo>
+                  <a:cubicBezTo>
+                    <a:pt x="199978" y="345819"/>
+                    <a:pt x="221266" y="373070"/>
+                    <a:pt x="236165" y="386185"/>
+                  </a:cubicBezTo>
+                  <a:cubicBezTo>
+                    <a:pt x="243801" y="396438"/>
+                    <a:pt x="260577" y="397254"/>
+                    <a:pt x="272119" y="387794"/>
+                  </a:cubicBezTo>
+                  <a:cubicBezTo>
+                    <a:pt x="272827" y="387190"/>
+                    <a:pt x="273122" y="386704"/>
+                    <a:pt x="273727" y="386185"/>
+                  </a:cubicBezTo>
+                  <a:cubicBezTo>
+                    <a:pt x="290724" y="368060"/>
+                    <a:pt x="308284" y="350583"/>
+                    <a:pt x="332107" y="322321"/>
+                  </a:cubicBezTo>
+                  <a:cubicBezTo>
+                    <a:pt x="346335" y="337532"/>
+                    <a:pt x="369223" y="358705"/>
+                    <a:pt x="376553" y="371158"/>
+                  </a:cubicBezTo>
+                  <a:cubicBezTo>
+                    <a:pt x="380259" y="376131"/>
+                    <a:pt x="385448" y="377385"/>
+                    <a:pt x="390550" y="377418"/>
+                  </a:cubicBezTo>
+                  <a:cubicBezTo>
+                    <a:pt x="392533" y="377796"/>
+                    <a:pt x="394225" y="377230"/>
+                    <a:pt x="396097" y="376604"/>
+                  </a:cubicBezTo>
+                  <a:cubicBezTo>
+                    <a:pt x="404209" y="374115"/>
+                    <a:pt x="408194" y="368773"/>
+                    <a:pt x="409471" y="361334"/>
+                  </a:cubicBezTo>
+                  <a:cubicBezTo>
+                    <a:pt x="432506" y="278124"/>
+                    <a:pt x="432905" y="146812"/>
+                    <a:pt x="462659" y="25449"/>
+                  </a:cubicBezTo>
+                  <a:cubicBezTo>
+                    <a:pt x="472551" y="26459"/>
+                    <a:pt x="487452" y="26642"/>
+                    <a:pt x="494470" y="25449"/>
                   </a:cubicBezTo>
                   <a:close/>
                   <a:moveTo>
-                    <a:pt x="443267" y="41613"/>
+                    <a:pt x="290256" y="25449"/>
                   </a:moveTo>
                   <a:cubicBezTo>
-                    <a:pt x="497092" y="39845"/>
-                    <a:pt x="564807" y="50374"/>
-                    <a:pt x="630205" y="41613"/>
-                  </a:cubicBezTo>
-                  <a:cubicBezTo>
-                    <a:pt x="584260" y="101597"/>
-                    <a:pt x="536081" y="154296"/>
-                    <a:pt x="506967" y="186635"/>
-                  </a:cubicBezTo>
-                  <a:cubicBezTo>
-                    <a:pt x="477602" y="162302"/>
-                    <a:pt x="440150" y="101332"/>
-                    <a:pt x="413401" y="76588"/>
-                  </a:cubicBezTo>
-                  <a:cubicBezTo>
-                    <a:pt x="423688" y="65004"/>
-                    <a:pt x="435439" y="47824"/>
-                    <a:pt x="443267" y="41613"/>
+                    <a:pt x="322685" y="26356"/>
+                    <a:pt x="362070" y="26150"/>
+                    <a:pt x="412665" y="25449"/>
+                  </a:cubicBezTo>
+                  <a:cubicBezTo>
+                    <a:pt x="383974" y="63977"/>
+                    <a:pt x="356087" y="88908"/>
+                    <a:pt x="331967" y="114138"/>
+                  </a:cubicBezTo>
+                  <a:cubicBezTo>
+                    <a:pt x="310595" y="96171"/>
+                    <a:pt x="285846" y="59469"/>
+                    <a:pt x="270699" y="46838"/>
+                  </a:cubicBezTo>
+                  <a:cubicBezTo>
+                    <a:pt x="275510" y="42637"/>
+                    <a:pt x="285477" y="32493"/>
+                    <a:pt x="290256" y="25449"/>
                   </a:cubicBezTo>
                   <a:close/>
                   <a:moveTo>
-                    <a:pt x="360797" y="76526"/>
+                    <a:pt x="236254" y="46800"/>
                   </a:moveTo>
                   <a:cubicBezTo>
-                    <a:pt x="335361" y="116157"/>
-                    <a:pt x="312947" y="130119"/>
-                    <a:pt x="268572" y="184554"/>
-                  </a:cubicBezTo>
-                  <a:cubicBezTo>
-                    <a:pt x="214360" y="120820"/>
-                    <a:pt x="181036" y="77305"/>
-                    <a:pt x="147102" y="41613"/>
-                  </a:cubicBezTo>
-                  <a:cubicBezTo>
-                    <a:pt x="190409" y="44155"/>
-                    <a:pt x="266486" y="45589"/>
-                    <a:pt x="331105" y="41613"/>
-                  </a:cubicBezTo>
-                  <a:cubicBezTo>
-                    <a:pt x="344731" y="59356"/>
-                    <a:pt x="349224" y="66180"/>
-                    <a:pt x="360797" y="76526"/>
+                    <a:pt x="212088" y="78199"/>
+                    <a:pt x="203690" y="77688"/>
+                    <a:pt x="175864" y="112865"/>
+                  </a:cubicBezTo>
+                  <a:cubicBezTo>
+                    <a:pt x="139583" y="72444"/>
+                    <a:pt x="115499" y="47457"/>
+                    <a:pt x="96324" y="25449"/>
+                  </a:cubicBezTo>
+                  <a:cubicBezTo>
+                    <a:pt x="122962" y="24283"/>
+                    <a:pt x="192596" y="30503"/>
+                    <a:pt x="216811" y="25449"/>
+                  </a:cubicBezTo>
+                  <a:cubicBezTo>
+                    <a:pt x="222701" y="30033"/>
+                    <a:pt x="228051" y="36755"/>
+                    <a:pt x="236254" y="46800"/>
                   </a:cubicBezTo>
                   <a:close/>
                   <a:moveTo>
-                    <a:pt x="242261" y="215390"/>
+                    <a:pt x="158635" y="131723"/>
                   </a:moveTo>
                   <a:cubicBezTo>
-                    <a:pt x="209919" y="256874"/>
-                    <a:pt x="189746" y="275698"/>
-                    <a:pt x="151610" y="321503"/>
-                  </a:cubicBezTo>
-                  <a:cubicBezTo>
-                    <a:pt x="138903" y="245506"/>
-                    <a:pt x="110880" y="119667"/>
-                    <a:pt x="113483" y="63897"/>
-                  </a:cubicBezTo>
-                  <a:cubicBezTo>
-                    <a:pt x="180988" y="136899"/>
-                    <a:pt x="211904" y="177219"/>
-                    <a:pt x="242261" y="215390"/>
+                    <a:pt x="139635" y="151934"/>
+                    <a:pt x="118117" y="180155"/>
+                    <a:pt x="99276" y="196617"/>
+                  </a:cubicBezTo>
+                  <a:cubicBezTo>
+                    <a:pt x="92267" y="164607"/>
+                    <a:pt x="75494" y="71830"/>
+                    <a:pt x="74310" y="39077"/>
+                  </a:cubicBezTo>
+                  <a:cubicBezTo>
+                    <a:pt x="93307" y="65967"/>
+                    <a:pt x="113347" y="91017"/>
+                    <a:pt x="158635" y="131723"/>
                   </a:cubicBezTo>
                   <a:close/>
                   <a:moveTo>
-                    <a:pt x="268532" y="246308"/>
+                    <a:pt x="175838" y="150631"/>
                   </a:moveTo>
                   <a:cubicBezTo>
-                    <a:pt x="298260" y="272130"/>
-                    <a:pt x="324900" y="310388"/>
-                    <a:pt x="362410" y="356770"/>
-                  </a:cubicBezTo>
-                  <a:cubicBezTo>
-                    <a:pt x="321211" y="405413"/>
-                    <a:pt x="310321" y="419359"/>
-                    <a:pt x="270787" y="464590"/>
-                  </a:cubicBezTo>
-                  <a:cubicBezTo>
-                    <a:pt x="228885" y="405200"/>
-                    <a:pt x="216789" y="410237"/>
-                    <a:pt x="176443" y="354128"/>
-                  </a:cubicBezTo>
-                  <a:cubicBezTo>
-                    <a:pt x="207221" y="318553"/>
-                    <a:pt x="249529" y="275832"/>
-                    <a:pt x="268532" y="246308"/>
+                    <a:pt x="191152" y="162175"/>
+                    <a:pt x="209911" y="181557"/>
+                    <a:pt x="237310" y="218185"/>
+                  </a:cubicBezTo>
+                  <a:cubicBezTo>
+                    <a:pt x="210632" y="250614"/>
+                    <a:pt x="205013" y="259686"/>
+                    <a:pt x="177314" y="284123"/>
+                  </a:cubicBezTo>
+                  <a:cubicBezTo>
+                    <a:pt x="154193" y="258307"/>
+                    <a:pt x="139653" y="239571"/>
+                    <a:pt x="115537" y="216569"/>
+                  </a:cubicBezTo>
+                  <a:cubicBezTo>
+                    <a:pt x="140074" y="194705"/>
+                    <a:pt x="156113" y="172579"/>
+                    <a:pt x="175838" y="150631"/>
                   </a:cubicBezTo>
                   <a:close/>
                   <a:moveTo>
-                    <a:pt x="294884" y="215452"/>
+                    <a:pt x="193093" y="131761"/>
                   </a:moveTo>
                   <a:cubicBezTo>
-                    <a:pt x="329846" y="167157"/>
-                    <a:pt x="354006" y="140756"/>
-                    <a:pt x="387109" y="107445"/>
-                  </a:cubicBezTo>
-                  <a:cubicBezTo>
-                    <a:pt x="423688" y="156355"/>
-                    <a:pt x="451927" y="177281"/>
-                    <a:pt x="480733" y="217553"/>
-                  </a:cubicBezTo>
-                  <a:cubicBezTo>
-                    <a:pt x="453791" y="250124"/>
-                    <a:pt x="413908" y="302211"/>
-                    <a:pt x="388702" y="325748"/>
-                  </a:cubicBezTo>
-                  <a:cubicBezTo>
-                    <a:pt x="366271" y="299958"/>
-                    <a:pt x="331114" y="263860"/>
-                    <a:pt x="294884" y="215452"/>
+                    <a:pt x="206383" y="112381"/>
+                    <a:pt x="229785" y="85292"/>
+                    <a:pt x="253483" y="65709"/>
+                  </a:cubicBezTo>
+                  <a:cubicBezTo>
+                    <a:pt x="279571" y="91707"/>
+                    <a:pt x="292330" y="111009"/>
+                    <a:pt x="314789" y="133046"/>
+                  </a:cubicBezTo>
+                  <a:cubicBezTo>
+                    <a:pt x="291035" y="163067"/>
+                    <a:pt x="271228" y="179575"/>
+                    <a:pt x="254526" y="199213"/>
+                  </a:cubicBezTo>
+                  <a:cubicBezTo>
+                    <a:pt x="235466" y="177885"/>
+                    <a:pt x="219313" y="162351"/>
+                    <a:pt x="193093" y="131761"/>
                   </a:cubicBezTo>
                   <a:close/>
                   <a:moveTo>
-                    <a:pt x="507005" y="248451"/>
+                    <a:pt x="331992" y="151942"/>
                   </a:moveTo>
                   <a:cubicBezTo>
-                    <a:pt x="529527" y="266783"/>
-                    <a:pt x="563888" y="314165"/>
-                    <a:pt x="599482" y="357207"/>
-                  </a:cubicBezTo>
-                  <a:cubicBezTo>
-                    <a:pt x="569350" y="402255"/>
-                    <a:pt x="545479" y="410530"/>
-                    <a:pt x="507199" y="465297"/>
-                  </a:cubicBezTo>
-                  <a:cubicBezTo>
-                    <a:pt x="475972" y="428617"/>
-                    <a:pt x="446816" y="395949"/>
-                    <a:pt x="414973" y="356749"/>
-                  </a:cubicBezTo>
-                  <a:cubicBezTo>
-                    <a:pt x="459524" y="306602"/>
-                    <a:pt x="482741" y="275259"/>
-                    <a:pt x="507005" y="248451"/>
+                    <a:pt x="356489" y="178222"/>
+                    <a:pt x="360248" y="187330"/>
+                    <a:pt x="392547" y="218452"/>
+                  </a:cubicBezTo>
+                  <a:cubicBezTo>
+                    <a:pt x="376658" y="242466"/>
+                    <a:pt x="351681" y="269432"/>
+                    <a:pt x="332119" y="284555"/>
+                  </a:cubicBezTo>
+                  <a:cubicBezTo>
+                    <a:pt x="305737" y="250400"/>
+                    <a:pt x="284382" y="237992"/>
+                    <a:pt x="271729" y="218172"/>
+                  </a:cubicBezTo>
+                  <a:cubicBezTo>
+                    <a:pt x="300296" y="192601"/>
+                    <a:pt x="308997" y="179704"/>
+                    <a:pt x="331992" y="151942"/>
                   </a:cubicBezTo>
                   <a:close/>
                   <a:moveTo>
-                    <a:pt x="625192" y="325623"/>
+                    <a:pt x="409382" y="199137"/>
                   </a:moveTo>
                   <a:cubicBezTo>
-                    <a:pt x="591847" y="285001"/>
-                    <a:pt x="554512" y="239536"/>
-                    <a:pt x="533277" y="217429"/>
-                  </a:cubicBezTo>
-                  <a:cubicBezTo>
-                    <a:pt x="588353" y="147988"/>
-                    <a:pt x="608953" y="125884"/>
-                    <a:pt x="663861" y="63793"/>
-                  </a:cubicBezTo>
-                  <a:cubicBezTo>
-                    <a:pt x="650769" y="121966"/>
-                    <a:pt x="642592" y="264929"/>
-                    <a:pt x="625192" y="325623"/>
+                    <a:pt x="392250" y="175320"/>
+                    <a:pt x="369288" y="153240"/>
+                    <a:pt x="349195" y="132970"/>
+                  </a:cubicBezTo>
+                  <a:cubicBezTo>
+                    <a:pt x="388236" y="83385"/>
+                    <a:pt x="396449" y="86156"/>
+                    <a:pt x="434703" y="39013"/>
+                  </a:cubicBezTo>
+                  <a:cubicBezTo>
+                    <a:pt x="425641" y="87355"/>
+                    <a:pt x="417998" y="119199"/>
+                    <a:pt x="409382" y="199137"/>
                   </a:cubicBezTo>
                   <a:close/>
                   <a:moveTo>
-                    <a:pt x="187152" y="562444"/>
+                    <a:pt x="122549" y="343966"/>
                   </a:moveTo>
                   <a:cubicBezTo>
-                    <a:pt x="181039" y="529175"/>
-                    <a:pt x="173808" y="473124"/>
-                    <a:pt x="163190" y="400297"/>
-                  </a:cubicBezTo>
-                  <a:cubicBezTo>
-                    <a:pt x="199503" y="433373"/>
-                    <a:pt x="218169" y="469948"/>
-                    <a:pt x="244477" y="495489"/>
-                  </a:cubicBezTo>
-                  <a:cubicBezTo>
-                    <a:pt x="220289" y="529840"/>
-                    <a:pt x="202705" y="545201"/>
-                    <a:pt x="187481" y="562547"/>
-                  </a:cubicBezTo>
-                  <a:cubicBezTo>
-                    <a:pt x="187431" y="562636"/>
-                    <a:pt x="187290" y="562617"/>
-                    <a:pt x="187207" y="562552"/>
-                  </a:cubicBezTo>
-                  <a:cubicBezTo>
-                    <a:pt x="187176" y="562524"/>
-                    <a:pt x="187160" y="562486"/>
-                    <a:pt x="187152" y="562444"/>
+                    <a:pt x="123214" y="321492"/>
+                    <a:pt x="110429" y="270474"/>
+                    <a:pt x="106859" y="244804"/>
+                  </a:cubicBezTo>
+                  <a:cubicBezTo>
+                    <a:pt x="126863" y="264338"/>
+                    <a:pt x="134639" y="276336"/>
+                    <a:pt x="160086" y="303019"/>
+                  </a:cubicBezTo>
+                  <a:cubicBezTo>
+                    <a:pt x="148415" y="315029"/>
+                    <a:pt x="137232" y="331336"/>
+                    <a:pt x="122765" y="344029"/>
+                  </a:cubicBezTo>
+                  <a:cubicBezTo>
+                    <a:pt x="122729" y="344086"/>
+                    <a:pt x="122647" y="344076"/>
+                    <a:pt x="122585" y="344032"/>
+                  </a:cubicBezTo>
+                  <a:cubicBezTo>
+                    <a:pt x="122568" y="344015"/>
+                    <a:pt x="122557" y="343992"/>
+                    <a:pt x="122549" y="343966"/>
                   </a:cubicBezTo>
                   <a:close/>
                   <a:moveTo>
-                    <a:pt x="389109" y="603224"/>
+                    <a:pt x="254793" y="368905"/>
                   </a:moveTo>
                   <a:cubicBezTo>
-                    <a:pt x="356681" y="560853"/>
-                    <a:pt x="319693" y="517335"/>
-                    <a:pt x="297078" y="495425"/>
-                  </a:cubicBezTo>
-                  <a:cubicBezTo>
-                    <a:pt x="315732" y="466094"/>
-                    <a:pt x="370176" y="419941"/>
-                    <a:pt x="388644" y="387690"/>
-                  </a:cubicBezTo>
-                  <a:cubicBezTo>
-                    <a:pt x="432841" y="439256"/>
-                    <a:pt x="459576" y="460951"/>
-                    <a:pt x="480809" y="496133"/>
-                  </a:cubicBezTo>
-                  <a:cubicBezTo>
-                    <a:pt x="456228" y="516136"/>
-                    <a:pt x="416629" y="565722"/>
-                    <a:pt x="389479" y="603224"/>
-                  </a:cubicBezTo>
-                  <a:cubicBezTo>
-                    <a:pt x="389413" y="603334"/>
-                    <a:pt x="389287" y="603373"/>
-                    <a:pt x="389187" y="603306"/>
-                  </a:cubicBezTo>
-                  <a:cubicBezTo>
-                    <a:pt x="389152" y="603286"/>
-                    <a:pt x="389132" y="603258"/>
-                    <a:pt x="389109" y="603224"/>
+                    <a:pt x="237967" y="351107"/>
+                    <a:pt x="213935" y="323531"/>
+                    <a:pt x="194530" y="302980"/>
+                  </a:cubicBezTo>
+                  <a:cubicBezTo>
+                    <a:pt x="209852" y="289486"/>
+                    <a:pt x="233036" y="257739"/>
+                    <a:pt x="254488" y="237094"/>
+                  </a:cubicBezTo>
+                  <a:cubicBezTo>
+                    <a:pt x="278369" y="263391"/>
+                    <a:pt x="289327" y="278213"/>
+                    <a:pt x="314839" y="303413"/>
+                  </a:cubicBezTo>
+                  <a:cubicBezTo>
+                    <a:pt x="289060" y="332629"/>
+                    <a:pt x="271677" y="353491"/>
+                    <a:pt x="255035" y="368905"/>
+                  </a:cubicBezTo>
+                  <a:cubicBezTo>
+                    <a:pt x="255007" y="368963"/>
+                    <a:pt x="254916" y="368988"/>
+                    <a:pt x="254844" y="368955"/>
+                  </a:cubicBezTo>
+                  <a:cubicBezTo>
+                    <a:pt x="254824" y="368943"/>
+                    <a:pt x="254804" y="368927"/>
+                    <a:pt x="254793" y="368905"/>
                   </a:cubicBezTo>
                   <a:close/>
                   <a:moveTo>
-                    <a:pt x="589806" y="562547"/>
+                    <a:pt x="386211" y="344029"/>
                   </a:moveTo>
                   <a:cubicBezTo>
-                    <a:pt x="566096" y="534474"/>
-                    <a:pt x="546439" y="510019"/>
-                    <a:pt x="533452" y="496195"/>
-                  </a:cubicBezTo>
-                  <a:cubicBezTo>
-                    <a:pt x="566755" y="448227"/>
-                    <a:pt x="585662" y="441320"/>
-                    <a:pt x="613882" y="402004"/>
-                  </a:cubicBezTo>
-                  <a:cubicBezTo>
-                    <a:pt x="611366" y="468277"/>
-                    <a:pt x="590120" y="511392"/>
-                    <a:pt x="590174" y="562444"/>
-                  </a:cubicBezTo>
-                  <a:cubicBezTo>
-                    <a:pt x="590143" y="562590"/>
-                    <a:pt x="590046" y="562633"/>
-                    <a:pt x="589922" y="562621"/>
-                  </a:cubicBezTo>
-                  <a:cubicBezTo>
-                    <a:pt x="589873" y="562615"/>
-                    <a:pt x="589839" y="562593"/>
-                    <a:pt x="589806" y="562547"/>
+                    <a:pt x="376061" y="329018"/>
+                    <a:pt x="358058" y="311781"/>
+                    <a:pt x="349310" y="303451"/>
+                  </a:cubicBezTo>
+                  <a:cubicBezTo>
+                    <a:pt x="368452" y="287702"/>
+                    <a:pt x="380080" y="275211"/>
+                    <a:pt x="401976" y="245848"/>
+                  </a:cubicBezTo>
+                  <a:cubicBezTo>
+                    <a:pt x="391379" y="288999"/>
+                    <a:pt x="395403" y="310640"/>
+                    <a:pt x="386452" y="343966"/>
+                  </a:cubicBezTo>
+                  <a:cubicBezTo>
+                    <a:pt x="386434" y="344038"/>
+                    <a:pt x="386356" y="344090"/>
+                    <a:pt x="386287" y="344074"/>
+                  </a:cubicBezTo>
+                  <a:cubicBezTo>
+                    <a:pt x="386254" y="344066"/>
+                    <a:pt x="386228" y="344056"/>
+                    <a:pt x="386211" y="344029"/>
                   </a:cubicBezTo>
                   <a:close/>
                 </a:path>
@@ -6655,23 +6588,6 @@
 </file>
 
 <file path=customXml/item1.xml><?xml version="1.0" encoding="utf-8"?>
-<p:properties xmlns:p="http://schemas.microsoft.com/office/2006/metadata/properties" xmlns:xsi="http://www.w3.org/2001/XMLSchema-instance" xmlns:pc="http://schemas.microsoft.com/office/infopath/2007/PartnerControls">
-  <documentManagement>
-    <_activity xmlns="21af955e-d138-411c-a64c-70dcfba52994" xsi:nil="true"/>
-  </documentManagement>
-</p:properties>
-</file>
-
-<file path=customXml/item2.xml><?xml version="1.0" encoding="utf-8"?>
-<?mso-contentType ?>
-<FormTemplates xmlns="http://schemas.microsoft.com/sharepoint/v3/contenttype/forms">
-  <Display>DocumentLibraryForm</Display>
-  <Edit>DocumentLibraryForm</Edit>
-  <New>DocumentLibraryForm</New>
-</FormTemplates>
-</file>
-
-<file path=customXml/item3.xml><?xml version="1.0" encoding="utf-8"?>
 <ct:contentTypeSchema xmlns:ct="http://schemas.microsoft.com/office/2006/metadata/contentType" xmlns:ma="http://schemas.microsoft.com/office/2006/metadata/properties/metaAttributes" ct:_="" ma:_="" ma:contentTypeName="Document" ma:contentTypeID="0x010100D88F73003D15944397800297E15BAA81" ma:contentTypeVersion="10" ma:contentTypeDescription="Create a new document." ma:contentTypeScope="" ma:versionID="b01242fdeddfed77721067e44ac21763">
   <xsd:schema xmlns:xsd="http://www.w3.org/2001/XMLSchema" xmlns:xs="http://www.w3.org/2001/XMLSchema" xmlns:p="http://schemas.microsoft.com/office/2006/metadata/properties" xmlns:ns3="21af955e-d138-411c-a64c-70dcfba52994" targetNamespace="http://schemas.microsoft.com/office/2006/metadata/properties" ma:root="true" ma:fieldsID="b640105d77f14323a4ff0aca991d00a4" ns3:_="">
     <xsd:import namespace="21af955e-d138-411c-a64c-70dcfba52994"/>
@@ -6851,31 +6767,24 @@
 </ct:contentTypeSchema>
 </file>
 
-<file path=customXml/itemProps1.xml><?xml version="1.0" encoding="utf-8"?>
-<ds:datastoreItem xmlns:ds="http://schemas.openxmlformats.org/officeDocument/2006/customXml" ds:itemID="{03CD6A2B-D2C8-488B-AF49-79ABB558A4E7}">
-  <ds:schemaRefs>
-    <ds:schemaRef ds:uri="http://purl.org/dc/dcmitype/"/>
-    <ds:schemaRef ds:uri="21af955e-d138-411c-a64c-70dcfba52994"/>
-    <ds:schemaRef ds:uri="http://schemas.microsoft.com/office/2006/documentManagement/types"/>
-    <ds:schemaRef ds:uri="http://purl.org/dc/terms/"/>
-    <ds:schemaRef ds:uri="http://www.w3.org/XML/1998/namespace"/>
-    <ds:schemaRef ds:uri="http://schemas.microsoft.com/office/infopath/2007/PartnerControls"/>
-    <ds:schemaRef ds:uri="http://schemas.microsoft.com/office/2006/metadata/properties"/>
-    <ds:schemaRef ds:uri="http://schemas.openxmlformats.org/package/2006/metadata/core-properties"/>
-    <ds:schemaRef ds:uri="http://purl.org/dc/elements/1.1/"/>
-  </ds:schemaRefs>
-</ds:datastoreItem>
+<file path=customXml/item2.xml><?xml version="1.0" encoding="utf-8"?>
+<?mso-contentType ?>
+<FormTemplates xmlns="http://schemas.microsoft.com/sharepoint/v3/contenttype/forms">
+  <Display>DocumentLibraryForm</Display>
+  <Edit>DocumentLibraryForm</Edit>
+  <New>DocumentLibraryForm</New>
+</FormTemplates>
 </file>
 
-<file path=customXml/itemProps2.xml><?xml version="1.0" encoding="utf-8"?>
-<ds:datastoreItem xmlns:ds="http://schemas.openxmlformats.org/officeDocument/2006/customXml" ds:itemID="{31701DDA-5A6B-4D78-AE1C-267CCFDDBAB4}">
-  <ds:schemaRefs>
-    <ds:schemaRef ds:uri="http://schemas.microsoft.com/sharepoint/v3/contenttype/forms"/>
-  </ds:schemaRefs>
-</ds:datastoreItem>
+<file path=customXml/item3.xml><?xml version="1.0" encoding="utf-8"?>
+<p:properties xmlns:p="http://schemas.microsoft.com/office/2006/metadata/properties" xmlns:xsi="http://www.w3.org/2001/XMLSchema-instance" xmlns:pc="http://schemas.microsoft.com/office/infopath/2007/PartnerControls">
+  <documentManagement>
+    <_activity xmlns="21af955e-d138-411c-a64c-70dcfba52994" xsi:nil="true"/>
+  </documentManagement>
+</p:properties>
 </file>
 
-<file path=customXml/itemProps3.xml><?xml version="1.0" encoding="utf-8"?>
+<file path=customXml/itemProps1.xml><?xml version="1.0" encoding="utf-8"?>
 <ds:datastoreItem xmlns:ds="http://schemas.openxmlformats.org/officeDocument/2006/customXml" ds:itemID="{ABF78B0D-D655-4529-B6B1-8EE3755F6CC9}">
   <ds:schemaRefs>
     <ds:schemaRef ds:uri="http://schemas.microsoft.com/office/2006/metadata/contentType"/>
@@ -6891,4 +6800,28 @@
     <ds:schemaRef ds:uri="http://schemas.microsoft.com/internal/obd"/>
   </ds:schemaRefs>
 </ds:datastoreItem>
+</file>
+
+<file path=customXml/itemProps2.xml><?xml version="1.0" encoding="utf-8"?>
+<ds:datastoreItem xmlns:ds="http://schemas.openxmlformats.org/officeDocument/2006/customXml" ds:itemID="{31701DDA-5A6B-4D78-AE1C-267CCFDDBAB4}">
+  <ds:schemaRefs>
+    <ds:schemaRef ds:uri="http://schemas.microsoft.com/sharepoint/v3/contenttype/forms"/>
+  </ds:schemaRefs>
+</ds:datastoreItem>
+</file>
+
+<file path=customXml/itemProps3.xml><?xml version="1.0" encoding="utf-8"?>
+<ds:datastoreItem xmlns:ds="http://schemas.openxmlformats.org/officeDocument/2006/customXml" ds:itemID="{03CD6A2B-D2C8-488B-AF49-79ABB558A4E7}">
+  <ds:schemaRefs>
+    <ds:schemaRef ds:uri="http://purl.org/dc/dcmitype/"/>
+    <ds:schemaRef ds:uri="21af955e-d138-411c-a64c-70dcfba52994"/>
+    <ds:schemaRef ds:uri="http://schemas.microsoft.com/office/2006/documentManagement/types"/>
+    <ds:schemaRef ds:uri="http://purl.org/dc/terms/"/>
+    <ds:schemaRef ds:uri="http://www.w3.org/XML/1998/namespace"/>
+    <ds:schemaRef ds:uri="http://schemas.microsoft.com/office/infopath/2007/PartnerControls"/>
+    <ds:schemaRef ds:uri="http://schemas.microsoft.com/office/2006/metadata/properties"/>
+    <ds:schemaRef ds:uri="http://schemas.openxmlformats.org/package/2006/metadata/core-properties"/>
+    <ds:schemaRef ds:uri="http://purl.org/dc/elements/1.1/"/>
+  </ds:schemaRefs>
+</ds:datastoreItem>
 </file>
</xml_diff>